<commit_message>
Included Back-end Algorithms Presentation and Videos
</commit_message>
<xml_diff>
--- a/PresentDemo/Delta Fountains.pptx
+++ b/PresentDemo/Delta Fountains.pptx
@@ -8,12 +8,13 @@
     <p:sldId id="256" r:id="rId2"/>
     <p:sldId id="257" r:id="rId3"/>
     <p:sldId id="261" r:id="rId4"/>
-    <p:sldId id="260" r:id="rId5"/>
-    <p:sldId id="259" r:id="rId6"/>
-    <p:sldId id="258" r:id="rId7"/>
-    <p:sldId id="263" r:id="rId8"/>
-    <p:sldId id="262" r:id="rId9"/>
-    <p:sldId id="264" r:id="rId10"/>
+    <p:sldId id="265" r:id="rId5"/>
+    <p:sldId id="260" r:id="rId6"/>
+    <p:sldId id="259" r:id="rId7"/>
+    <p:sldId id="258" r:id="rId8"/>
+    <p:sldId id="263" r:id="rId9"/>
+    <p:sldId id="262" r:id="rId10"/>
+    <p:sldId id="264" r:id="rId11"/>
   </p:sldIdLst>
   <p:sldSz cx="12192000" cy="6858000"/>
   <p:notesSz cx="6858000" cy="9144000"/>
@@ -246,7 +247,7 @@
           <a:p>
             <a:fld id="{70555D37-1F87-4CCF-9CE1-02DA0673E71D}" type="datetimeFigureOut">
               <a:rPr lang="en-CA" smtClean="0"/>
-              <a:t>25/03/2015</a:t>
+              <a:t>27/03/2015</a:t>
             </a:fld>
             <a:endParaRPr lang="en-CA"/>
           </a:p>
@@ -416,7 +417,7 @@
           <a:p>
             <a:fld id="{70555D37-1F87-4CCF-9CE1-02DA0673E71D}" type="datetimeFigureOut">
               <a:rPr lang="en-CA" smtClean="0"/>
-              <a:t>25/03/2015</a:t>
+              <a:t>27/03/2015</a:t>
             </a:fld>
             <a:endParaRPr lang="en-CA"/>
           </a:p>
@@ -596,7 +597,7 @@
           <a:p>
             <a:fld id="{70555D37-1F87-4CCF-9CE1-02DA0673E71D}" type="datetimeFigureOut">
               <a:rPr lang="en-CA" smtClean="0"/>
-              <a:t>25/03/2015</a:t>
+              <a:t>27/03/2015</a:t>
             </a:fld>
             <a:endParaRPr lang="en-CA"/>
           </a:p>
@@ -766,7 +767,7 @@
           <a:p>
             <a:fld id="{70555D37-1F87-4CCF-9CE1-02DA0673E71D}" type="datetimeFigureOut">
               <a:rPr lang="en-CA" smtClean="0"/>
-              <a:t>25/03/2015</a:t>
+              <a:t>27/03/2015</a:t>
             </a:fld>
             <a:endParaRPr lang="en-CA"/>
           </a:p>
@@ -1012,7 +1013,7 @@
           <a:p>
             <a:fld id="{70555D37-1F87-4CCF-9CE1-02DA0673E71D}" type="datetimeFigureOut">
               <a:rPr lang="en-CA" smtClean="0"/>
-              <a:t>25/03/2015</a:t>
+              <a:t>27/03/2015</a:t>
             </a:fld>
             <a:endParaRPr lang="en-CA"/>
           </a:p>
@@ -1244,7 +1245,7 @@
           <a:p>
             <a:fld id="{70555D37-1F87-4CCF-9CE1-02DA0673E71D}" type="datetimeFigureOut">
               <a:rPr lang="en-CA" smtClean="0"/>
-              <a:t>25/03/2015</a:t>
+              <a:t>27/03/2015</a:t>
             </a:fld>
             <a:endParaRPr lang="en-CA"/>
           </a:p>
@@ -1611,7 +1612,7 @@
           <a:p>
             <a:fld id="{70555D37-1F87-4CCF-9CE1-02DA0673E71D}" type="datetimeFigureOut">
               <a:rPr lang="en-CA" smtClean="0"/>
-              <a:t>25/03/2015</a:t>
+              <a:t>27/03/2015</a:t>
             </a:fld>
             <a:endParaRPr lang="en-CA"/>
           </a:p>
@@ -1729,7 +1730,7 @@
           <a:p>
             <a:fld id="{70555D37-1F87-4CCF-9CE1-02DA0673E71D}" type="datetimeFigureOut">
               <a:rPr lang="en-CA" smtClean="0"/>
-              <a:t>25/03/2015</a:t>
+              <a:t>27/03/2015</a:t>
             </a:fld>
             <a:endParaRPr lang="en-CA"/>
           </a:p>
@@ -1824,7 +1825,7 @@
           <a:p>
             <a:fld id="{70555D37-1F87-4CCF-9CE1-02DA0673E71D}" type="datetimeFigureOut">
               <a:rPr lang="en-CA" smtClean="0"/>
-              <a:t>25/03/2015</a:t>
+              <a:t>27/03/2015</a:t>
             </a:fld>
             <a:endParaRPr lang="en-CA"/>
           </a:p>
@@ -2101,7 +2102,7 @@
           <a:p>
             <a:fld id="{70555D37-1F87-4CCF-9CE1-02DA0673E71D}" type="datetimeFigureOut">
               <a:rPr lang="en-CA" smtClean="0"/>
-              <a:t>25/03/2015</a:t>
+              <a:t>27/03/2015</a:t>
             </a:fld>
             <a:endParaRPr lang="en-CA"/>
           </a:p>
@@ -2354,7 +2355,7 @@
           <a:p>
             <a:fld id="{70555D37-1F87-4CCF-9CE1-02DA0673E71D}" type="datetimeFigureOut">
               <a:rPr lang="en-CA" smtClean="0"/>
-              <a:t>25/03/2015</a:t>
+              <a:t>27/03/2015</a:t>
             </a:fld>
             <a:endParaRPr lang="en-CA"/>
           </a:p>
@@ -2567,7 +2568,7 @@
           <a:p>
             <a:fld id="{70555D37-1F87-4CCF-9CE1-02DA0673E71D}" type="datetimeFigureOut">
               <a:rPr lang="en-CA" smtClean="0"/>
-              <a:t>25/03/2015</a:t>
+              <a:t>27/03/2015</a:t>
             </a:fld>
             <a:endParaRPr lang="en-CA"/>
           </a:p>
@@ -3014,14 +3015,23 @@
             <p:ph type="ctrTitle"/>
           </p:nvPr>
         </p:nvSpPr>
-        <p:spPr/>
+        <p:spPr>
+          <a:xfrm>
+            <a:off x="1506907" y="760576"/>
+            <a:ext cx="9144000" cy="1390606"/>
+          </a:xfrm>
+        </p:spPr>
         <p:txBody>
           <a:bodyPr/>
           <a:lstStyle/>
           <a:p>
             <a:r>
               <a:rPr lang="en-CA" dirty="0" smtClean="0"/>
-              <a:t>Delta Fountains</a:t>
+              <a:t>Delta </a:t>
+            </a:r>
+            <a:r>
+              <a:rPr lang="en-CA" dirty="0" smtClean="0"/>
+              <a:t>Laser</a:t>
             </a:r>
             <a:endParaRPr lang="en-CA" dirty="0"/>
           </a:p>
@@ -3037,7 +3047,12 @@
             <p:ph type="subTitle" idx="1"/>
           </p:nvPr>
         </p:nvSpPr>
-        <p:spPr/>
+        <p:spPr>
+          <a:xfrm>
+            <a:off x="1600912" y="5383849"/>
+            <a:ext cx="9144000" cy="1352373"/>
+          </a:xfrm>
+        </p:spPr>
         <p:txBody>
           <a:bodyPr/>
           <a:lstStyle/>
@@ -3050,10 +3065,166 @@
           </a:p>
         </p:txBody>
       </p:sp>
+      <p:pic>
+        <p:nvPicPr>
+          <p:cNvPr id="4" name="Picture 3"/>
+          <p:cNvPicPr>
+            <a:picLocks noChangeAspect="1"/>
+          </p:cNvPicPr>
+          <p:nvPr/>
+        </p:nvPicPr>
+        <p:blipFill>
+          <a:blip r:embed="rId2" cstate="print">
+            <a:extLst>
+              <a:ext uri="{28A0092B-C50C-407E-A947-70E740481C1C}">
+                <a14:useLocalDpi xmlns:a14="http://schemas.microsoft.com/office/drawing/2010/main" val="0"/>
+              </a:ext>
+            </a:extLst>
+          </a:blip>
+          <a:stretch>
+            <a:fillRect/>
+          </a:stretch>
+        </p:blipFill>
+        <p:spPr>
+          <a:xfrm>
+            <a:off x="4793056" y="2409365"/>
+            <a:ext cx="2809893" cy="2564287"/>
+          </a:xfrm>
+          <a:prstGeom prst="rect">
+            <a:avLst/>
+          </a:prstGeom>
+          <a:effectLst>
+            <a:softEdge rad="190500"/>
+          </a:effectLst>
+        </p:spPr>
+      </p:pic>
     </p:spTree>
     <p:extLst>
       <p:ext uri="{BB962C8B-B14F-4D97-AF65-F5344CB8AC3E}">
         <p14:creationId xmlns:p14="http://schemas.microsoft.com/office/powerpoint/2010/main" val="3011163271"/>
+      </p:ext>
+    </p:extLst>
+  </p:cSld>
+  <p:clrMapOvr>
+    <a:masterClrMapping/>
+  </p:clrMapOvr>
+  <p:timing>
+    <p:tnLst>
+      <p:par>
+        <p:cTn id="1" dur="indefinite" restart="never" nodeType="tmRoot"/>
+      </p:par>
+    </p:tnLst>
+  </p:timing>
+</p:sld>
+</file>
+
+<file path=ppt/slides/slide10.xml><?xml version="1.0" encoding="utf-8"?>
+<p:sld xmlns:a="http://schemas.openxmlformats.org/drawingml/2006/main" xmlns:r="http://schemas.openxmlformats.org/officeDocument/2006/relationships" xmlns:p="http://schemas.openxmlformats.org/presentationml/2006/main">
+  <p:cSld>
+    <p:bg>
+      <p:bgPr>
+        <a:gradFill>
+          <a:gsLst>
+            <a:gs pos="0">
+              <a:schemeClr val="accent5">
+                <a:lumMod val="75000"/>
+              </a:schemeClr>
+            </a:gs>
+            <a:gs pos="37000">
+              <a:schemeClr val="accent5">
+                <a:lumMod val="40000"/>
+                <a:lumOff val="60000"/>
+              </a:schemeClr>
+            </a:gs>
+            <a:gs pos="66000">
+              <a:schemeClr val="accent5">
+                <a:lumMod val="40000"/>
+                <a:lumOff val="60000"/>
+              </a:schemeClr>
+            </a:gs>
+            <a:gs pos="100000">
+              <a:schemeClr val="accent5">
+                <a:lumMod val="75000"/>
+              </a:schemeClr>
+            </a:gs>
+          </a:gsLst>
+          <a:lin ang="5400000" scaled="1"/>
+        </a:gradFill>
+        <a:effectLst/>
+      </p:bgPr>
+    </p:bg>
+    <p:spTree>
+      <p:nvGrpSpPr>
+        <p:cNvPr id="1" name=""/>
+        <p:cNvGrpSpPr/>
+        <p:nvPr/>
+      </p:nvGrpSpPr>
+      <p:grpSpPr>
+        <a:xfrm>
+          <a:off x="0" y="0"/>
+          <a:ext cx="0" cy="0"/>
+          <a:chOff x="0" y="0"/>
+          <a:chExt cx="0" cy="0"/>
+        </a:xfrm>
+      </p:grpSpPr>
+      <p:sp>
+        <p:nvSpPr>
+          <p:cNvPr id="2" name="Title 1"/>
+          <p:cNvSpPr>
+            <a:spLocks noGrp="1"/>
+          </p:cNvSpPr>
+          <p:nvPr>
+            <p:ph type="ctrTitle"/>
+          </p:nvPr>
+        </p:nvSpPr>
+        <p:spPr>
+          <a:xfrm>
+            <a:off x="1405466" y="528003"/>
+            <a:ext cx="9144000" cy="1011237"/>
+          </a:xfrm>
+        </p:spPr>
+        <p:txBody>
+          <a:bodyPr/>
+          <a:lstStyle/>
+          <a:p>
+            <a:r>
+              <a:rPr lang="en-CA" dirty="0" smtClean="0"/>
+              <a:t>Project Delta</a:t>
+            </a:r>
+            <a:endParaRPr lang="en-CA" dirty="0"/>
+          </a:p>
+        </p:txBody>
+      </p:sp>
+      <p:pic>
+        <p:nvPicPr>
+          <p:cNvPr id="4" name="parHdSlYiXY"/>
+          <p:cNvPicPr>
+            <a:picLocks noRot="1" noChangeAspect="1"/>
+          </p:cNvPicPr>
+          <p:nvPr>
+            <a:videoFile r:link="rId1"/>
+          </p:nvPr>
+        </p:nvPicPr>
+        <p:blipFill>
+          <a:blip r:embed="rId3"/>
+          <a:stretch>
+            <a:fillRect/>
+          </a:stretch>
+        </p:blipFill>
+        <p:spPr>
+          <a:xfrm>
+            <a:off x="2103120" y="1722120"/>
+            <a:ext cx="8236373" cy="4632960"/>
+          </a:xfrm>
+          <a:prstGeom prst="rect">
+            <a:avLst/>
+          </a:prstGeom>
+        </p:spPr>
+      </p:pic>
+    </p:spTree>
+    <p:extLst>
+      <p:ext uri="{BB962C8B-B14F-4D97-AF65-F5344CB8AC3E}">
+        <p14:creationId xmlns:p14="http://schemas.microsoft.com/office/powerpoint/2010/main" val="1229901578"/>
       </p:ext>
     </p:extLst>
   </p:cSld>
@@ -3129,38 +3300,52 @@
             <p:ph type="ctrTitle"/>
           </p:nvPr>
         </p:nvSpPr>
-        <p:spPr/>
-        <p:txBody>
-          <a:bodyPr/>
+        <p:spPr>
+          <a:xfrm>
+            <a:off x="1529079" y="381000"/>
+            <a:ext cx="9144000" cy="1005840"/>
+          </a:xfrm>
+        </p:spPr>
+        <p:txBody>
+          <a:bodyPr>
+            <a:normAutofit fontScale="90000"/>
+          </a:bodyPr>
           <a:lstStyle/>
           <a:p>
             <a:r>
               <a:rPr lang="en-CA" dirty="0" smtClean="0"/>
-              <a:t>Video Presentation</a:t>
+              <a:t>The Mini-Kossel Delta 3D Printer</a:t>
             </a:r>
             <a:endParaRPr lang="en-CA" dirty="0"/>
           </a:p>
         </p:txBody>
       </p:sp>
-      <p:sp>
-        <p:nvSpPr>
-          <p:cNvPr id="3" name="Subtitle 2"/>
-          <p:cNvSpPr>
-            <a:spLocks noGrp="1"/>
-          </p:cNvSpPr>
-          <p:nvPr>
-            <p:ph type="subTitle" idx="1"/>
-          </p:nvPr>
-        </p:nvSpPr>
-        <p:spPr/>
-        <p:txBody>
-          <a:bodyPr/>
-          <a:lstStyle/>
-          <a:p>
-            <a:endParaRPr lang="en-CA" dirty="0"/>
-          </a:p>
-        </p:txBody>
-      </p:sp>
+      <p:pic>
+        <p:nvPicPr>
+          <p:cNvPr id="4" name="JrchvvXyw6I"/>
+          <p:cNvPicPr>
+            <a:picLocks noRot="1" noChangeAspect="1"/>
+          </p:cNvPicPr>
+          <p:nvPr>
+            <a:videoFile r:link="rId1"/>
+          </p:nvPr>
+        </p:nvPicPr>
+        <p:blipFill>
+          <a:blip r:embed="rId3"/>
+          <a:stretch>
+            <a:fillRect/>
+          </a:stretch>
+        </p:blipFill>
+        <p:spPr>
+          <a:xfrm>
+            <a:off x="2106506" y="1783080"/>
+            <a:ext cx="7829973" cy="4404360"/>
+          </a:xfrm>
+          <a:prstGeom prst="rect">
+            <a:avLst/>
+          </a:prstGeom>
+        </p:spPr>
+      </p:pic>
     </p:spTree>
     <p:extLst>
       <p:ext uri="{BB962C8B-B14F-4D97-AF65-F5344CB8AC3E}">
@@ -3240,35 +3425,250 @@
             <p:ph type="ctrTitle"/>
           </p:nvPr>
         </p:nvSpPr>
-        <p:spPr/>
-        <p:txBody>
-          <a:bodyPr/>
-          <a:lstStyle/>
-          <a:p>
-            <a:r>
-              <a:rPr lang="en-CA" dirty="0" smtClean="0"/>
-              <a:t>Dave</a:t>
-            </a:r>
+        <p:spPr>
+          <a:xfrm>
+            <a:off x="1623985" y="444381"/>
+            <a:ext cx="9144000" cy="1410056"/>
+          </a:xfrm>
+        </p:spPr>
+        <p:txBody>
+          <a:bodyPr>
+            <a:normAutofit fontScale="90000"/>
+          </a:bodyPr>
+          <a:lstStyle/>
+          <a:p>
+            <a:r>
+              <a:rPr lang="en-CA" sz="5000" dirty="0" smtClean="0"/>
+              <a:t>Backend and Algorithms </a:t>
+            </a:r>
+            <a:br>
+              <a:rPr lang="en-CA" sz="5000" dirty="0" smtClean="0"/>
+            </a:br>
+            <a:r>
+              <a:rPr lang="en-CA" sz="5000" dirty="0" smtClean="0"/>
+              <a:t>Roadmap</a:t>
+            </a:r>
+            <a:endParaRPr lang="en-CA" sz="5000" dirty="0"/>
+          </a:p>
+        </p:txBody>
+      </p:sp>
+      <p:sp>
+        <p:nvSpPr>
+          <p:cNvPr id="3" name="Subtitle 2"/>
+          <p:cNvSpPr>
+            <a:spLocks noGrp="1"/>
+          </p:cNvSpPr>
+          <p:nvPr>
+            <p:ph type="subTitle" idx="1"/>
+          </p:nvPr>
+        </p:nvSpPr>
+        <p:spPr>
+          <a:xfrm>
+            <a:off x="623844" y="2102264"/>
+            <a:ext cx="5913690" cy="4580547"/>
+          </a:xfrm>
+        </p:spPr>
+        <p:txBody>
+          <a:bodyPr>
+            <a:normAutofit lnSpcReduction="10000"/>
+          </a:bodyPr>
+          <a:lstStyle/>
+          <a:p>
+            <a:pPr algn="l"/>
+            <a:r>
+              <a:rPr lang="en-CA" sz="2800" b="1" dirty="0" smtClean="0"/>
+              <a:t>January:</a:t>
+            </a:r>
+          </a:p>
+          <a:p>
+            <a:pPr algn="l"/>
+            <a:r>
+              <a:rPr lang="en-CA" sz="2000" dirty="0" smtClean="0"/>
+              <a:t>●   Project Proposal</a:t>
+            </a:r>
+            <a:endParaRPr lang="en-CA" sz="2000" b="1" dirty="0" smtClean="0"/>
+          </a:p>
+          <a:p>
+            <a:pPr algn="l"/>
+            <a:r>
+              <a:rPr lang="en-CA" sz="2000" dirty="0" smtClean="0"/>
+              <a:t>●   Print/Cut and Order Parts</a:t>
+            </a:r>
+          </a:p>
+          <a:p>
+            <a:pPr algn="l"/>
+            <a:r>
+              <a:rPr lang="en-CA" sz="2000" dirty="0" smtClean="0"/>
+              <a:t>●   Begin Software Research and Development</a:t>
+            </a:r>
+            <a:endParaRPr lang="en-CA" sz="2000" b="1" dirty="0"/>
+          </a:p>
+          <a:p>
+            <a:pPr algn="l"/>
+            <a:r>
+              <a:rPr lang="en-CA" sz="2000" dirty="0" smtClean="0"/>
+              <a:t>●   Assemble</a:t>
+            </a:r>
+            <a:endParaRPr lang="en-CA" sz="2000" b="1" dirty="0"/>
+          </a:p>
+          <a:p>
+            <a:pPr algn="l"/>
+            <a:r>
+              <a:rPr lang="en-CA" sz="2800" b="1" dirty="0"/>
+              <a:t/>
+            </a:r>
+            <a:br>
+              <a:rPr lang="en-CA" sz="2800" b="1" dirty="0"/>
+            </a:br>
+            <a:r>
+              <a:rPr lang="en-CA" sz="2800" b="1" dirty="0" smtClean="0"/>
+              <a:t>February:</a:t>
+            </a:r>
+          </a:p>
+          <a:p>
+            <a:pPr algn="l"/>
+            <a:r>
+              <a:rPr lang="en-CA" sz="2000" dirty="0" smtClean="0"/>
+              <a:t>●   Finish Assembly</a:t>
+            </a:r>
+          </a:p>
+          <a:p>
+            <a:pPr algn="l"/>
+            <a:r>
+              <a:rPr lang="en-CA" sz="2000" dirty="0" smtClean="0"/>
+              <a:t>●   Troubleshoot RAMPS and Arduino</a:t>
+            </a:r>
+          </a:p>
+          <a:p>
+            <a:pPr algn="l"/>
+            <a:r>
+              <a:rPr lang="en-CA" sz="2000" dirty="0" smtClean="0"/>
+              <a:t>●   Troubleshoot RAMPS with new Arduino</a:t>
+            </a:r>
+          </a:p>
+          <a:p>
+            <a:pPr algn="l"/>
+            <a:r>
+              <a:rPr lang="en-CA" sz="2000" dirty="0" smtClean="0"/>
+              <a:t>●   Continue Research and Development</a:t>
+            </a:r>
+            <a:endParaRPr lang="en-CA" sz="2000" dirty="0" smtClean="0"/>
+          </a:p>
+          <a:p>
             <a:endParaRPr lang="en-CA" dirty="0"/>
           </a:p>
-        </p:txBody>
-      </p:sp>
-      <p:sp>
-        <p:nvSpPr>
-          <p:cNvPr id="3" name="Subtitle 2"/>
-          <p:cNvSpPr>
-            <a:spLocks noGrp="1"/>
-          </p:cNvSpPr>
-          <p:nvPr>
-            <p:ph type="subTitle" idx="1"/>
-          </p:nvPr>
-        </p:nvSpPr>
-        <p:spPr/>
-        <p:txBody>
-          <a:bodyPr/>
-          <a:lstStyle/>
           <a:p>
             <a:endParaRPr lang="en-CA" dirty="0"/>
+          </a:p>
+        </p:txBody>
+      </p:sp>
+      <p:sp>
+        <p:nvSpPr>
+          <p:cNvPr id="4" name="TextBox 3"/>
+          <p:cNvSpPr txBox="1"/>
+          <p:nvPr/>
+        </p:nvSpPr>
+        <p:spPr>
+          <a:xfrm>
+            <a:off x="6084606" y="2008261"/>
+            <a:ext cx="5537673" cy="3139321"/>
+          </a:xfrm>
+          <a:prstGeom prst="rect">
+            <a:avLst/>
+          </a:prstGeom>
+          <a:noFill/>
+        </p:spPr>
+        <p:txBody>
+          <a:bodyPr wrap="square" rtlCol="0">
+            <a:spAutoFit/>
+          </a:bodyPr>
+          <a:lstStyle/>
+          <a:p>
+            <a:r>
+              <a:rPr lang="en-CA" sz="2800" b="1" dirty="0"/>
+              <a:t>March:</a:t>
+            </a:r>
+            <a:endParaRPr lang="en-CA" sz="2800" dirty="0"/>
+          </a:p>
+          <a:p>
+            <a:pPr>
+              <a:spcBef>
+                <a:spcPts val="1000"/>
+              </a:spcBef>
+            </a:pPr>
+            <a:r>
+              <a:rPr lang="en-CA" sz="2000" dirty="0"/>
+              <a:t>●   </a:t>
+            </a:r>
+            <a:r>
+              <a:rPr lang="en-CA" sz="2000" dirty="0" smtClean="0"/>
+              <a:t>Develop Python Script and Load on Raspberry Pi</a:t>
+            </a:r>
+          </a:p>
+          <a:p>
+            <a:pPr>
+              <a:spcBef>
+                <a:spcPts val="1000"/>
+              </a:spcBef>
+            </a:pPr>
+            <a:r>
+              <a:rPr lang="en-CA" sz="2000" dirty="0" smtClean="0"/>
+              <a:t>●   Test Input into </a:t>
+            </a:r>
+            <a:r>
+              <a:rPr lang="en-CA" sz="2000" dirty="0" err="1" smtClean="0"/>
+              <a:t>Pololu</a:t>
+            </a:r>
+            <a:r>
+              <a:rPr lang="en-CA" sz="2000" dirty="0" smtClean="0"/>
+              <a:t> Drivers</a:t>
+            </a:r>
+            <a:endParaRPr lang="en-CA" sz="2000" b="1" dirty="0"/>
+          </a:p>
+          <a:p>
+            <a:pPr>
+              <a:spcBef>
+                <a:spcPts val="1000"/>
+              </a:spcBef>
+            </a:pPr>
+            <a:r>
+              <a:rPr lang="en-CA" sz="2000" dirty="0" smtClean="0"/>
+              <a:t>●   Test New RAMPS with Working Arduino</a:t>
+            </a:r>
+          </a:p>
+          <a:p>
+            <a:pPr>
+              <a:spcBef>
+                <a:spcPts val="1000"/>
+              </a:spcBef>
+            </a:pPr>
+            <a:r>
+              <a:rPr lang="en-CA" sz="2000" dirty="0" smtClean="0"/>
+              <a:t>●   Test Server with Delta Robot</a:t>
+            </a:r>
+          </a:p>
+          <a:p>
+            <a:pPr>
+              <a:spcBef>
+                <a:spcPts val="1000"/>
+              </a:spcBef>
+            </a:pPr>
+            <a:r>
+              <a:rPr lang="en-CA" sz="2000" dirty="0" smtClean="0"/>
+              <a:t>●   Install Required Software on Raspberry Pi</a:t>
+            </a:r>
+          </a:p>
+          <a:p>
+            <a:pPr>
+              <a:spcBef>
+                <a:spcPts val="1000"/>
+              </a:spcBef>
+            </a:pPr>
+            <a:r>
+              <a:rPr lang="en-CA" sz="2000" dirty="0" smtClean="0"/>
+              <a:t>●   Test Server and App via Raspberry Pi</a:t>
+            </a:r>
+            <a:endParaRPr lang="en-CA" sz="2000" dirty="0"/>
           </a:p>
         </p:txBody>
       </p:sp>
@@ -3351,14 +3751,19 @@
             <p:ph type="ctrTitle"/>
           </p:nvPr>
         </p:nvSpPr>
-        <p:spPr/>
+        <p:spPr>
+          <a:xfrm>
+            <a:off x="2521294" y="515461"/>
+            <a:ext cx="9144000" cy="980757"/>
+          </a:xfrm>
+        </p:spPr>
         <p:txBody>
           <a:bodyPr/>
           <a:lstStyle/>
           <a:p>
             <a:r>
               <a:rPr lang="en-CA" dirty="0" smtClean="0"/>
-              <a:t>Dave</a:t>
+              <a:t>Skills in Hardware</a:t>
             </a:r>
             <a:endParaRPr lang="en-CA" dirty="0"/>
           </a:p>
@@ -3374,19 +3779,139 @@
             <p:ph type="subTitle" idx="1"/>
           </p:nvPr>
         </p:nvSpPr>
-        <p:spPr/>
-        <p:txBody>
-          <a:bodyPr/>
-          <a:lstStyle/>
-          <a:p>
+        <p:spPr>
+          <a:xfrm>
+            <a:off x="3474720" y="1854359"/>
+            <a:ext cx="8229600" cy="4512258"/>
+          </a:xfrm>
+        </p:spPr>
+        <p:txBody>
+          <a:bodyPr>
+            <a:normAutofit/>
+          </a:bodyPr>
+          <a:lstStyle/>
+          <a:p>
+            <a:pPr algn="l"/>
+            <a:r>
+              <a:rPr lang="en-CA" sz="2800" b="1" dirty="0" smtClean="0"/>
+              <a:t>Course of References:   </a:t>
+            </a:r>
+          </a:p>
+          <a:p>
+            <a:pPr algn="l"/>
+            <a:r>
+              <a:rPr lang="en-CA" dirty="0" smtClean="0"/>
+              <a:t>●   Electric Circuits (TECH 101) - Embedded Systems</a:t>
+            </a:r>
+            <a:endParaRPr lang="en-CA" dirty="0" smtClean="0"/>
+          </a:p>
+          <a:p>
+            <a:pPr algn="l"/>
+            <a:r>
+              <a:rPr lang="en-CA" dirty="0" smtClean="0"/>
+              <a:t>●   Hardware </a:t>
+            </a:r>
+            <a:r>
+              <a:rPr lang="en-CA" dirty="0"/>
+              <a:t>Production Technology </a:t>
+            </a:r>
+          </a:p>
+          <a:p>
+            <a:pPr algn="l"/>
+            <a:endParaRPr lang="en-CA" b="1" dirty="0"/>
+          </a:p>
+          <a:p>
+            <a:pPr algn="l"/>
+            <a:r>
+              <a:rPr lang="en-CA" sz="2800" b="1" dirty="0" smtClean="0"/>
+              <a:t>Skills:</a:t>
+            </a:r>
+            <a:endParaRPr lang="en-CA" sz="2800" b="1" dirty="0"/>
+          </a:p>
+          <a:p>
+            <a:pPr algn="l"/>
+            <a:r>
+              <a:rPr lang="en-CA" dirty="0" smtClean="0"/>
+              <a:t>●   Measuring Voltages and Resistance </a:t>
+            </a:r>
+          </a:p>
+          <a:p>
+            <a:pPr algn="l"/>
+            <a:r>
+              <a:rPr lang="en-CA" dirty="0" smtClean="0"/>
+              <a:t>●   Working with Stepper Motors</a:t>
+            </a:r>
+          </a:p>
+          <a:p>
+            <a:pPr algn="l"/>
+            <a:r>
+              <a:rPr lang="en-CA" dirty="0" smtClean="0"/>
+              <a:t>●   Soldering and Wiring</a:t>
+            </a:r>
             <a:endParaRPr lang="en-CA" dirty="0"/>
           </a:p>
-        </p:txBody>
-      </p:sp>
+          <a:p>
+            <a:pPr algn="l"/>
+            <a:endParaRPr lang="en-CA" dirty="0" smtClean="0"/>
+          </a:p>
+          <a:p>
+            <a:endParaRPr lang="en-CA" dirty="0"/>
+          </a:p>
+          <a:p>
+            <a:endParaRPr lang="en-CA" dirty="0"/>
+          </a:p>
+        </p:txBody>
+      </p:sp>
+      <p:pic>
+        <p:nvPicPr>
+          <p:cNvPr id="1026" name="Picture 2" descr="D:\Users\Redfield_01\Kossel\Presentation\IMG_20141110_210206165_HDR.jpg"/>
+          <p:cNvPicPr>
+            <a:picLocks noChangeAspect="1" noChangeArrowheads="1"/>
+          </p:cNvPicPr>
+          <p:nvPr/>
+        </p:nvPicPr>
+        <p:blipFill>
+          <a:blip r:embed="rId2" cstate="print">
+            <a:extLst>
+              <a:ext uri="{28A0092B-C50C-407E-A947-70E740481C1C}">
+                <a14:useLocalDpi xmlns:a14="http://schemas.microsoft.com/office/drawing/2010/main" val="0"/>
+              </a:ext>
+            </a:extLst>
+          </a:blip>
+          <a:stretch>
+            <a:fillRect/>
+          </a:stretch>
+        </p:blipFill>
+        <p:spPr bwMode="auto">
+          <a:xfrm>
+            <a:off x="218121" y="1005840"/>
+            <a:ext cx="3088640" cy="5486400"/>
+          </a:xfrm>
+          <a:prstGeom prst="rect">
+            <a:avLst/>
+          </a:prstGeom>
+          <a:noFill/>
+          <a:effectLst>
+            <a:glow>
+              <a:schemeClr val="accent1"/>
+            </a:glow>
+            <a:softEdge rad="355600"/>
+          </a:effectLst>
+          <a:extLst>
+            <a:ext uri="{909E8E84-426E-40DD-AFC4-6F175D3DCCD1}">
+              <a14:hiddenFill xmlns:a14="http://schemas.microsoft.com/office/drawing/2010/main">
+                <a:solidFill>
+                  <a:srgbClr val="FFFFFF"/>
+                </a:solidFill>
+              </a14:hiddenFill>
+            </a:ext>
+          </a:extLst>
+        </p:spPr>
+      </p:pic>
     </p:spTree>
     <p:extLst>
       <p:ext uri="{BB962C8B-B14F-4D97-AF65-F5344CB8AC3E}">
-        <p14:creationId xmlns:p14="http://schemas.microsoft.com/office/powerpoint/2010/main" val="1684025747"/>
+        <p14:creationId xmlns:p14="http://schemas.microsoft.com/office/powerpoint/2010/main" val="1677548882"/>
       </p:ext>
     </p:extLst>
   </p:cSld>
@@ -3462,14 +3987,19 @@
             <p:ph type="ctrTitle"/>
           </p:nvPr>
         </p:nvSpPr>
-        <p:spPr/>
+        <p:spPr>
+          <a:xfrm>
+            <a:off x="1522149" y="409277"/>
+            <a:ext cx="9144000" cy="1117917"/>
+          </a:xfrm>
+        </p:spPr>
         <p:txBody>
           <a:bodyPr/>
           <a:lstStyle/>
           <a:p>
             <a:r>
               <a:rPr lang="en-CA" dirty="0" smtClean="0"/>
-              <a:t>Dave</a:t>
+              <a:t>Skills in Software</a:t>
             </a:r>
             <a:endParaRPr lang="en-CA" dirty="0"/>
           </a:p>
@@ -3485,19 +4015,248 @@
             <p:ph type="subTitle" idx="1"/>
           </p:nvPr>
         </p:nvSpPr>
-        <p:spPr/>
-        <p:txBody>
-          <a:bodyPr/>
-          <a:lstStyle/>
-          <a:p>
+        <p:spPr>
+          <a:xfrm>
+            <a:off x="2911875" y="1799870"/>
+            <a:ext cx="7907045" cy="3413065"/>
+          </a:xfrm>
+        </p:spPr>
+        <p:txBody>
+          <a:bodyPr>
+            <a:normAutofit fontScale="92500" lnSpcReduction="20000"/>
+          </a:bodyPr>
+          <a:lstStyle/>
+          <a:p>
+            <a:pPr algn="l"/>
+            <a:r>
+              <a:rPr lang="en-CA" sz="2800" b="1" dirty="0"/>
+              <a:t>Course of References:   </a:t>
+            </a:r>
+            <a:endParaRPr lang="en-CA" sz="2800" b="1" dirty="0" smtClean="0"/>
+          </a:p>
+          <a:p>
+            <a:pPr algn="l"/>
+            <a:r>
+              <a:rPr lang="en-CA" dirty="0" smtClean="0"/>
+              <a:t>●    Technical C</a:t>
+            </a:r>
+          </a:p>
+          <a:p>
+            <a:pPr algn="l"/>
+            <a:r>
+              <a:rPr lang="en-CA" dirty="0"/>
+              <a:t>● </a:t>
+            </a:r>
+            <a:r>
+              <a:rPr lang="en-CA" dirty="0" smtClean="0"/>
+              <a:t>   Programming </a:t>
+            </a:r>
+            <a:r>
+              <a:rPr lang="en-CA" dirty="0"/>
+              <a:t>Techniques in </a:t>
+            </a:r>
+            <a:r>
+              <a:rPr lang="en-CA" dirty="0" smtClean="0"/>
+              <a:t>Java</a:t>
+            </a:r>
+          </a:p>
+          <a:p>
+            <a:pPr algn="l"/>
+            <a:r>
+              <a:rPr lang="en-CA" dirty="0"/>
+              <a:t>● </a:t>
+            </a:r>
+            <a:r>
+              <a:rPr lang="en-CA" dirty="0" smtClean="0"/>
+              <a:t>   Internet Programming</a:t>
+            </a:r>
+          </a:p>
+          <a:p>
+            <a:pPr algn="l"/>
+            <a:endParaRPr lang="en-CA" b="1" dirty="0"/>
+          </a:p>
+          <a:p>
+            <a:pPr algn="l"/>
+            <a:r>
+              <a:rPr lang="en-CA" sz="2800" b="1" dirty="0"/>
+              <a:t>Skills:</a:t>
+            </a:r>
+          </a:p>
+          <a:p>
+            <a:pPr algn="l"/>
+            <a:r>
+              <a:rPr lang="en-CA" dirty="0"/>
+              <a:t>●   </a:t>
+            </a:r>
+            <a:r>
+              <a:rPr lang="en-CA" dirty="0" smtClean="0"/>
+              <a:t>Solid Foundation in Programming and Algorithm Development</a:t>
+            </a:r>
             <a:endParaRPr lang="en-CA" dirty="0"/>
           </a:p>
-        </p:txBody>
-      </p:sp>
+          <a:p>
+            <a:pPr algn="l"/>
+            <a:r>
+              <a:rPr lang="en-CA" dirty="0"/>
+              <a:t>●  </a:t>
+            </a:r>
+            <a:r>
+              <a:rPr lang="en-CA" dirty="0" smtClean="0"/>
+              <a:t> Learn How to Learn (API’s)</a:t>
+            </a:r>
+            <a:endParaRPr lang="en-CA" dirty="0"/>
+          </a:p>
+          <a:p>
+            <a:pPr algn="l"/>
+            <a:r>
+              <a:rPr lang="en-CA" dirty="0"/>
+              <a:t>●   </a:t>
+            </a:r>
+            <a:r>
+              <a:rPr lang="en-CA" dirty="0" smtClean="0"/>
+              <a:t>Programming for Network Communication</a:t>
+            </a:r>
+            <a:endParaRPr lang="en-CA" dirty="0"/>
+          </a:p>
+          <a:p>
+            <a:pPr algn="l"/>
+            <a:endParaRPr lang="en-CA" dirty="0"/>
+          </a:p>
+          <a:p>
+            <a:endParaRPr lang="en-CA" dirty="0"/>
+          </a:p>
+          <a:p>
+            <a:endParaRPr lang="en-CA" dirty="0"/>
+          </a:p>
+        </p:txBody>
+      </p:sp>
+      <p:pic>
+        <p:nvPicPr>
+          <p:cNvPr id="2050" name="Picture 2" descr="D:\Users\Redfield_01\Pictures\Technology\java-mini-logo.png"/>
+          <p:cNvPicPr>
+            <a:picLocks noChangeAspect="1" noChangeArrowheads="1"/>
+          </p:cNvPicPr>
+          <p:nvPr/>
+        </p:nvPicPr>
+        <p:blipFill>
+          <a:blip r:embed="rId2">
+            <a:extLst>
+              <a:ext uri="{28A0092B-C50C-407E-A947-70E740481C1C}">
+                <a14:useLocalDpi xmlns:a14="http://schemas.microsoft.com/office/drawing/2010/main" val="0"/>
+              </a:ext>
+            </a:extLst>
+          </a:blip>
+          <a:srcRect/>
+          <a:stretch>
+            <a:fillRect/>
+          </a:stretch>
+        </p:blipFill>
+        <p:spPr bwMode="auto">
+          <a:xfrm>
+            <a:off x="9562191" y="1869863"/>
+            <a:ext cx="1905000" cy="1495425"/>
+          </a:xfrm>
+          <a:prstGeom prst="rect">
+            <a:avLst/>
+          </a:prstGeom>
+          <a:noFill/>
+          <a:extLst>
+            <a:ext uri="{909E8E84-426E-40DD-AFC4-6F175D3DCCD1}">
+              <a14:hiddenFill xmlns:a14="http://schemas.microsoft.com/office/drawing/2010/main">
+                <a:solidFill>
+                  <a:srgbClr val="FFFFFF"/>
+                </a:solidFill>
+              </a14:hiddenFill>
+            </a:ext>
+          </a:extLst>
+        </p:spPr>
+      </p:pic>
+      <p:pic>
+        <p:nvPicPr>
+          <p:cNvPr id="2051" name="Picture 3" descr="D:\Users\Redfield_01\Pictures\Technology\The_C_Programming_Language_cover.svg.png"/>
+          <p:cNvPicPr>
+            <a:picLocks noChangeAspect="1" noChangeArrowheads="1"/>
+          </p:cNvPicPr>
+          <p:nvPr/>
+        </p:nvPicPr>
+        <p:blipFill>
+          <a:blip r:embed="rId3" cstate="print">
+            <a:extLst>
+              <a:ext uri="{28A0092B-C50C-407E-A947-70E740481C1C}">
+                <a14:useLocalDpi xmlns:a14="http://schemas.microsoft.com/office/drawing/2010/main" val="0"/>
+              </a:ext>
+            </a:extLst>
+          </a:blip>
+          <a:srcRect/>
+          <a:stretch>
+            <a:fillRect/>
+          </a:stretch>
+        </p:blipFill>
+        <p:spPr bwMode="auto">
+          <a:xfrm>
+            <a:off x="255064" y="1715949"/>
+            <a:ext cx="2306249" cy="2978905"/>
+          </a:xfrm>
+          <a:prstGeom prst="rect">
+            <a:avLst/>
+          </a:prstGeom>
+          <a:noFill/>
+          <a:extLst>
+            <a:ext uri="{909E8E84-426E-40DD-AFC4-6F175D3DCCD1}">
+              <a14:hiddenFill xmlns:a14="http://schemas.microsoft.com/office/drawing/2010/main">
+                <a:solidFill>
+                  <a:srgbClr val="FFFFFF"/>
+                </a:solidFill>
+              </a14:hiddenFill>
+            </a:ext>
+          </a:extLst>
+        </p:spPr>
+      </p:pic>
+      <p:pic>
+        <p:nvPicPr>
+          <p:cNvPr id="2052" name="Picture 4" descr="D:\Users\Redfield_01\Pictures\Technology\python-logo-master-v3-TM.png"/>
+          <p:cNvPicPr>
+            <a:picLocks noChangeAspect="1" noChangeArrowheads="1"/>
+          </p:cNvPicPr>
+          <p:nvPr/>
+        </p:nvPicPr>
+        <p:blipFill>
+          <a:blip r:embed="rId4">
+            <a:extLst>
+              <a:ext uri="{28A0092B-C50C-407E-A947-70E740481C1C}">
+                <a14:useLocalDpi xmlns:a14="http://schemas.microsoft.com/office/drawing/2010/main" val="0"/>
+              </a:ext>
+            </a:extLst>
+          </a:blip>
+          <a:srcRect/>
+          <a:stretch>
+            <a:fillRect/>
+          </a:stretch>
+        </p:blipFill>
+        <p:spPr bwMode="auto">
+          <a:xfrm>
+            <a:off x="4737079" y="5362606"/>
+            <a:ext cx="3388918" cy="1144726"/>
+          </a:xfrm>
+          <a:prstGeom prst="rect">
+            <a:avLst/>
+          </a:prstGeom>
+          <a:noFill/>
+          <a:extLst>
+            <a:ext uri="{909E8E84-426E-40DD-AFC4-6F175D3DCCD1}">
+              <a14:hiddenFill xmlns:a14="http://schemas.microsoft.com/office/drawing/2010/main">
+                <a:solidFill>
+                  <a:srgbClr val="FFFFFF"/>
+                </a:solidFill>
+              </a14:hiddenFill>
+            </a:ext>
+          </a:extLst>
+        </p:spPr>
+      </p:pic>
     </p:spTree>
     <p:extLst>
       <p:ext uri="{BB962C8B-B14F-4D97-AF65-F5344CB8AC3E}">
-        <p14:creationId xmlns:p14="http://schemas.microsoft.com/office/powerpoint/2010/main" val="20573662"/>
+        <p14:creationId xmlns:p14="http://schemas.microsoft.com/office/powerpoint/2010/main" val="1684025747"/>
       </p:ext>
     </p:extLst>
   </p:cSld>
@@ -3575,17 +4334,19 @@
         </p:nvSpPr>
         <p:spPr>
           <a:xfrm>
-            <a:off x="1524000" y="1122363"/>
-            <a:ext cx="9144000" cy="986656"/>
-          </a:xfrm>
-        </p:spPr>
-        <p:txBody>
-          <a:bodyPr/>
+            <a:off x="1199260" y="610475"/>
+            <a:ext cx="9144000" cy="808987"/>
+          </a:xfrm>
+        </p:spPr>
+        <p:txBody>
+          <a:bodyPr>
+            <a:normAutofit fontScale="90000"/>
+          </a:bodyPr>
           <a:lstStyle/>
           <a:p>
             <a:r>
               <a:rPr lang="en-CA" dirty="0" smtClean="0"/>
-              <a:t>Planning and Schedule</a:t>
+              <a:t>Skills in Networking</a:t>
             </a:r>
             <a:endParaRPr lang="en-CA" dirty="0"/>
           </a:p>
@@ -3603,80 +4364,319 @@
         </p:nvSpPr>
         <p:spPr>
           <a:xfrm>
-            <a:off x="1524000" y="1991032"/>
-            <a:ext cx="9144000" cy="3266768"/>
-          </a:xfrm>
-        </p:spPr>
-        <p:txBody>
-          <a:bodyPr/>
-          <a:lstStyle/>
-          <a:p>
-            <a:pPr marL="342900" indent="-342900" algn="l">
-              <a:buFont typeface="Arial" panose="020B0604020202020204" pitchFamily="34" charset="0"/>
-              <a:buChar char="•"/>
-            </a:pPr>
+            <a:off x="335169" y="1893708"/>
+            <a:ext cx="7082581" cy="4455817"/>
+          </a:xfrm>
+        </p:spPr>
+        <p:txBody>
+          <a:bodyPr>
+            <a:normAutofit/>
+          </a:bodyPr>
+          <a:lstStyle/>
+          <a:p>
+            <a:pPr algn="l"/>
+            <a:r>
+              <a:rPr lang="en-CA" b="1" dirty="0"/>
+              <a:t>Course of References:   </a:t>
+            </a:r>
+            <a:endParaRPr lang="en-CA" dirty="0"/>
+          </a:p>
+          <a:p>
+            <a:pPr algn="l"/>
+            <a:r>
+              <a:rPr lang="en-CA" dirty="0"/>
+              <a:t>● </a:t>
+            </a:r>
             <a:r>
               <a:rPr lang="en-CA" dirty="0" smtClean="0"/>
-              <a:t>App UI design </a:t>
-            </a:r>
-          </a:p>
-          <a:p>
-            <a:pPr marL="342900" indent="-342900" algn="l">
-              <a:buFont typeface="Arial" panose="020B0604020202020204" pitchFamily="34" charset="0"/>
-              <a:buChar char="•"/>
-            </a:pPr>
+              <a:t>  Network Programming</a:t>
+            </a:r>
+          </a:p>
+          <a:p>
+            <a:pPr algn="l"/>
             <a:r>
               <a:rPr lang="en-CA" dirty="0" smtClean="0"/>
-              <a:t>Joystick controller implemented</a:t>
-            </a:r>
-          </a:p>
-          <a:p>
-            <a:pPr marL="342900" indent="-342900" algn="l">
-              <a:buFont typeface="Arial" panose="020B0604020202020204" pitchFamily="34" charset="0"/>
-              <a:buChar char="•"/>
-            </a:pPr>
+              <a:t>●   Networking </a:t>
+            </a:r>
+            <a:r>
+              <a:rPr lang="en-CA" dirty="0"/>
+              <a:t>Technologies </a:t>
+            </a:r>
+            <a:endParaRPr lang="en-CA" dirty="0" smtClean="0"/>
+          </a:p>
+          <a:p>
+            <a:pPr algn="l"/>
             <a:r>
               <a:rPr lang="en-CA" dirty="0" smtClean="0"/>
-              <a:t>Socket server implemented</a:t>
-            </a:r>
-          </a:p>
-          <a:p>
-            <a:pPr marL="342900" indent="-342900" algn="l">
-              <a:buFont typeface="Arial" panose="020B0604020202020204" pitchFamily="34" charset="0"/>
-              <a:buChar char="•"/>
-            </a:pPr>
+              <a:t>●   Network Administration</a:t>
+            </a:r>
+          </a:p>
+          <a:p>
+            <a:pPr algn="l"/>
+            <a:endParaRPr lang="en-CA" b="1" dirty="0" smtClean="0"/>
+          </a:p>
+          <a:p>
+            <a:pPr algn="l"/>
+            <a:r>
+              <a:rPr lang="en-CA" b="1" dirty="0" smtClean="0"/>
+              <a:t>Skills</a:t>
+            </a:r>
+            <a:r>
+              <a:rPr lang="en-CA" b="1" dirty="0"/>
+              <a:t>:</a:t>
+            </a:r>
+          </a:p>
+          <a:p>
+            <a:pPr algn="l"/>
             <a:r>
               <a:rPr lang="en-CA" dirty="0" smtClean="0"/>
-              <a:t>Signals sent to server</a:t>
+              <a:t>●   Creating Client/Server Solutions </a:t>
             </a:r>
           </a:p>
           <a:p>
             <a:pPr algn="l"/>
-            <a:endParaRPr lang="en-CA" dirty="0" smtClean="0"/>
-          </a:p>
-          <a:p>
-            <a:pPr marL="342900" indent="-342900" algn="l">
-              <a:buFont typeface="Arial" panose="020B0604020202020204" pitchFamily="34" charset="0"/>
-              <a:buChar char="•"/>
-            </a:pPr>
             <a:r>
               <a:rPr lang="en-CA" dirty="0" smtClean="0"/>
-              <a:t>Subnet issue between Phone and Server </a:t>
-            </a:r>
-          </a:p>
-          <a:p>
-            <a:pPr marL="342900" indent="-342900" algn="l">
-              <a:buFont typeface="Arial" panose="020B0604020202020204" pitchFamily="34" charset="0"/>
-              <a:buChar char="•"/>
-            </a:pPr>
+              <a:t>●   Addressing, Protocols, Subnets, etc.</a:t>
+            </a:r>
+          </a:p>
+          <a:p>
+            <a:pPr algn="l"/>
+            <a:r>
+              <a:rPr lang="en-CA" dirty="0" smtClean="0"/>
+              <a:t>●   Troubleshooting with Networking Tools</a:t>
+            </a:r>
+          </a:p>
+          <a:p>
+            <a:pPr algn="l"/>
             <a:endParaRPr lang="en-CA" dirty="0"/>
+          </a:p>
+          <a:p>
+            <a:pPr algn="l"/>
+            <a:endParaRPr lang="en-CA" dirty="0"/>
+          </a:p>
+          <a:p>
+            <a:endParaRPr lang="en-CA" dirty="0"/>
+          </a:p>
+        </p:txBody>
+      </p:sp>
+      <p:pic>
+        <p:nvPicPr>
+          <p:cNvPr id="3074" name="Picture 2" descr="D:\Users\Redfield_01\Pictures\Technology\nmaplogo.png"/>
+          <p:cNvPicPr>
+            <a:picLocks noChangeAspect="1" noChangeArrowheads="1"/>
+          </p:cNvPicPr>
+          <p:nvPr/>
+        </p:nvPicPr>
+        <p:blipFill>
+          <a:blip r:embed="rId2">
+            <a:extLst>
+              <a:ext uri="{28A0092B-C50C-407E-A947-70E740481C1C}">
+                <a14:useLocalDpi xmlns:a14="http://schemas.microsoft.com/office/drawing/2010/main" val="0"/>
+              </a:ext>
+            </a:extLst>
+          </a:blip>
+          <a:srcRect/>
+          <a:stretch>
+            <a:fillRect/>
+          </a:stretch>
+        </p:blipFill>
+        <p:spPr bwMode="auto">
+          <a:xfrm>
+            <a:off x="564661" y="562456"/>
+            <a:ext cx="1709737" cy="915988"/>
+          </a:xfrm>
+          <a:prstGeom prst="rect">
+            <a:avLst/>
+          </a:prstGeom>
+          <a:noFill/>
+          <a:effectLst>
+            <a:softEdge rad="12700"/>
+          </a:effectLst>
+          <a:extLst>
+            <a:ext uri="{909E8E84-426E-40DD-AFC4-6F175D3DCCD1}">
+              <a14:hiddenFill xmlns:a14="http://schemas.microsoft.com/office/drawing/2010/main">
+                <a:solidFill>
+                  <a:srgbClr val="FFFFFF"/>
+                </a:solidFill>
+              </a14:hiddenFill>
+            </a:ext>
+          </a:extLst>
+        </p:spPr>
+      </p:pic>
+      <p:pic>
+        <p:nvPicPr>
+          <p:cNvPr id="3075" name="Picture 3" descr="D:\Users\Redfield_01\Pictures\Technology\1024px-Ranger_Grip_75.JPG"/>
+          <p:cNvPicPr>
+            <a:picLocks noChangeAspect="1" noChangeArrowheads="1"/>
+          </p:cNvPicPr>
+          <p:nvPr/>
+        </p:nvPicPr>
+        <p:blipFill>
+          <a:blip r:embed="rId3" cstate="print">
+            <a:extLst>
+              <a:ext uri="{28A0092B-C50C-407E-A947-70E740481C1C}">
+                <a14:useLocalDpi xmlns:a14="http://schemas.microsoft.com/office/drawing/2010/main" val="0"/>
+              </a:ext>
+            </a:extLst>
+          </a:blip>
+          <a:srcRect/>
+          <a:stretch>
+            <a:fillRect/>
+          </a:stretch>
+        </p:blipFill>
+        <p:spPr bwMode="auto">
+          <a:xfrm>
+            <a:off x="9366191" y="747062"/>
+            <a:ext cx="2300836" cy="1633757"/>
+          </a:xfrm>
+          <a:prstGeom prst="rect">
+            <a:avLst/>
+          </a:prstGeom>
+          <a:noFill/>
+          <a:effectLst>
+            <a:softEdge rad="88900"/>
+          </a:effectLst>
+          <a:extLst>
+            <a:ext uri="{909E8E84-426E-40DD-AFC4-6F175D3DCCD1}">
+              <a14:hiddenFill xmlns:a14="http://schemas.microsoft.com/office/drawing/2010/main">
+                <a:solidFill>
+                  <a:srgbClr val="FFFFFF"/>
+                </a:solidFill>
+              </a14:hiddenFill>
+            </a:ext>
+          </a:extLst>
+        </p:spPr>
+      </p:pic>
+      <p:pic>
+        <p:nvPicPr>
+          <p:cNvPr id="3076" name="Picture 4" descr="D:\Users\Redfield_01\Pictures\Technology\sku_201064_1.jpg"/>
+          <p:cNvPicPr>
+            <a:picLocks noChangeAspect="1" noChangeArrowheads="1"/>
+          </p:cNvPicPr>
+          <p:nvPr/>
+        </p:nvPicPr>
+        <p:blipFill>
+          <a:blip r:embed="rId4" cstate="print">
+            <a:extLst>
+              <a:ext uri="{28A0092B-C50C-407E-A947-70E740481C1C}">
+                <a14:useLocalDpi xmlns:a14="http://schemas.microsoft.com/office/drawing/2010/main" val="0"/>
+              </a:ext>
+            </a:extLst>
+          </a:blip>
+          <a:srcRect/>
+          <a:stretch>
+            <a:fillRect/>
+          </a:stretch>
+        </p:blipFill>
+        <p:spPr bwMode="auto">
+          <a:xfrm>
+            <a:off x="6961530" y="3068630"/>
+            <a:ext cx="1292152" cy="1292152"/>
+          </a:xfrm>
+          <a:prstGeom prst="rect">
+            <a:avLst/>
+          </a:prstGeom>
+          <a:noFill/>
+          <a:effectLst>
+            <a:softEdge rad="266700"/>
+          </a:effectLst>
+          <a:extLst>
+            <a:ext uri="{909E8E84-426E-40DD-AFC4-6F175D3DCCD1}">
+              <a14:hiddenFill xmlns:a14="http://schemas.microsoft.com/office/drawing/2010/main">
+                <a:solidFill>
+                  <a:srgbClr val="FFFFFF"/>
+                </a:solidFill>
+              </a14:hiddenFill>
+            </a:ext>
+          </a:extLst>
+        </p:spPr>
+      </p:pic>
+      <p:pic>
+        <p:nvPicPr>
+          <p:cNvPr id="3077" name="Picture 5" descr="D:\Users\Redfield_01\Pictures\Technology\Raspi_Colour_R.png"/>
+          <p:cNvPicPr>
+            <a:picLocks noChangeAspect="1" noChangeArrowheads="1"/>
+          </p:cNvPicPr>
+          <p:nvPr/>
+        </p:nvPicPr>
+        <p:blipFill>
+          <a:blip r:embed="rId5" cstate="print">
+            <a:extLst>
+              <a:ext uri="{28A0092B-C50C-407E-A947-70E740481C1C}">
+                <a14:useLocalDpi xmlns:a14="http://schemas.microsoft.com/office/drawing/2010/main" val="0"/>
+              </a:ext>
+            </a:extLst>
+          </a:blip>
+          <a:srcRect/>
+          <a:stretch>
+            <a:fillRect/>
+          </a:stretch>
+        </p:blipFill>
+        <p:spPr bwMode="auto">
+          <a:xfrm>
+            <a:off x="4645225" y="3068629"/>
+            <a:ext cx="1071910" cy="1292153"/>
+          </a:xfrm>
+          <a:prstGeom prst="rect">
+            <a:avLst/>
+          </a:prstGeom>
+          <a:noFill/>
+          <a:extLst>
+            <a:ext uri="{909E8E84-426E-40DD-AFC4-6F175D3DCCD1}">
+              <a14:hiddenFill xmlns:a14="http://schemas.microsoft.com/office/drawing/2010/main">
+                <a:solidFill>
+                  <a:srgbClr val="FFFFFF"/>
+                </a:solidFill>
+              </a14:hiddenFill>
+            </a:ext>
+          </a:extLst>
+        </p:spPr>
+      </p:pic>
+      <p:sp>
+        <p:nvSpPr>
+          <p:cNvPr id="4" name="Plus 3"/>
+          <p:cNvSpPr/>
+          <p:nvPr/>
+        </p:nvSpPr>
+        <p:spPr>
+          <a:xfrm>
+            <a:off x="5839640" y="3257505"/>
+            <a:ext cx="914400" cy="914400"/>
+          </a:xfrm>
+          <a:prstGeom prst="mathPlus">
+            <a:avLst/>
+          </a:prstGeom>
+        </p:spPr>
+        <p:style>
+          <a:lnRef idx="2">
+            <a:schemeClr val="accent1">
+              <a:shade val="50000"/>
+            </a:schemeClr>
+          </a:lnRef>
+          <a:fillRef idx="1">
+            <a:schemeClr val="accent1"/>
+          </a:fillRef>
+          <a:effectRef idx="0">
+            <a:schemeClr val="accent1"/>
+          </a:effectRef>
+          <a:fontRef idx="minor">
+            <a:schemeClr val="lt1"/>
+          </a:fontRef>
+        </p:style>
+        <p:txBody>
+          <a:bodyPr rtlCol="0" anchor="ctr"/>
+          <a:lstStyle/>
+          <a:p>
+            <a:pPr algn="ctr"/>
+            <a:endParaRPr lang="en-CA"/>
           </a:p>
         </p:txBody>
       </p:sp>
     </p:spTree>
     <p:extLst>
       <p:ext uri="{BB962C8B-B14F-4D97-AF65-F5344CB8AC3E}">
-        <p14:creationId xmlns:p14="http://schemas.microsoft.com/office/powerpoint/2010/main" val="424934719"/>
+        <p14:creationId xmlns:p14="http://schemas.microsoft.com/office/powerpoint/2010/main" val="20573662"/>
       </p:ext>
     </p:extLst>
   </p:cSld>
@@ -3755,6 +4755,185 @@
         <p:spPr>
           <a:xfrm>
             <a:off x="1524000" y="1122363"/>
+            <a:ext cx="9144000" cy="986656"/>
+          </a:xfrm>
+        </p:spPr>
+        <p:txBody>
+          <a:bodyPr/>
+          <a:lstStyle/>
+          <a:p>
+            <a:r>
+              <a:rPr lang="en-CA" dirty="0" smtClean="0"/>
+              <a:t>Planning and Schedule</a:t>
+            </a:r>
+            <a:endParaRPr lang="en-CA" dirty="0"/>
+          </a:p>
+        </p:txBody>
+      </p:sp>
+      <p:sp>
+        <p:nvSpPr>
+          <p:cNvPr id="3" name="Subtitle 2"/>
+          <p:cNvSpPr>
+            <a:spLocks noGrp="1"/>
+          </p:cNvSpPr>
+          <p:nvPr>
+            <p:ph type="subTitle" idx="1"/>
+          </p:nvPr>
+        </p:nvSpPr>
+        <p:spPr>
+          <a:xfrm>
+            <a:off x="1524000" y="1991032"/>
+            <a:ext cx="9144000" cy="3266768"/>
+          </a:xfrm>
+        </p:spPr>
+        <p:txBody>
+          <a:bodyPr/>
+          <a:lstStyle/>
+          <a:p>
+            <a:pPr marL="342900" indent="-342900" algn="l">
+              <a:buFont typeface="Arial" panose="020B0604020202020204" pitchFamily="34" charset="0"/>
+              <a:buChar char="•"/>
+            </a:pPr>
+            <a:r>
+              <a:rPr lang="en-CA" dirty="0" smtClean="0"/>
+              <a:t>App UI design </a:t>
+            </a:r>
+          </a:p>
+          <a:p>
+            <a:pPr marL="342900" indent="-342900" algn="l">
+              <a:buFont typeface="Arial" panose="020B0604020202020204" pitchFamily="34" charset="0"/>
+              <a:buChar char="•"/>
+            </a:pPr>
+            <a:r>
+              <a:rPr lang="en-CA" dirty="0" smtClean="0"/>
+              <a:t>Joystick controller implemented</a:t>
+            </a:r>
+          </a:p>
+          <a:p>
+            <a:pPr marL="342900" indent="-342900" algn="l">
+              <a:buFont typeface="Arial" panose="020B0604020202020204" pitchFamily="34" charset="0"/>
+              <a:buChar char="•"/>
+            </a:pPr>
+            <a:r>
+              <a:rPr lang="en-CA" dirty="0" smtClean="0"/>
+              <a:t>Socket server implemented</a:t>
+            </a:r>
+          </a:p>
+          <a:p>
+            <a:pPr marL="342900" indent="-342900" algn="l">
+              <a:buFont typeface="Arial" panose="020B0604020202020204" pitchFamily="34" charset="0"/>
+              <a:buChar char="•"/>
+            </a:pPr>
+            <a:r>
+              <a:rPr lang="en-CA" dirty="0" smtClean="0"/>
+              <a:t>Signals sent to server</a:t>
+            </a:r>
+          </a:p>
+          <a:p>
+            <a:pPr algn="l"/>
+            <a:endParaRPr lang="en-CA" dirty="0" smtClean="0"/>
+          </a:p>
+          <a:p>
+            <a:pPr marL="342900" indent="-342900" algn="l">
+              <a:buFont typeface="Arial" panose="020B0604020202020204" pitchFamily="34" charset="0"/>
+              <a:buChar char="•"/>
+            </a:pPr>
+            <a:r>
+              <a:rPr lang="en-CA" dirty="0" smtClean="0"/>
+              <a:t>Subnet issue between Phone and Server </a:t>
+            </a:r>
+          </a:p>
+          <a:p>
+            <a:pPr marL="342900" indent="-342900" algn="l">
+              <a:buFont typeface="Arial" panose="020B0604020202020204" pitchFamily="34" charset="0"/>
+              <a:buChar char="•"/>
+            </a:pPr>
+            <a:endParaRPr lang="en-CA" dirty="0"/>
+          </a:p>
+        </p:txBody>
+      </p:sp>
+    </p:spTree>
+    <p:extLst>
+      <p:ext uri="{BB962C8B-B14F-4D97-AF65-F5344CB8AC3E}">
+        <p14:creationId xmlns:p14="http://schemas.microsoft.com/office/powerpoint/2010/main" val="424934719"/>
+      </p:ext>
+    </p:extLst>
+  </p:cSld>
+  <p:clrMapOvr>
+    <a:masterClrMapping/>
+  </p:clrMapOvr>
+  <p:timing>
+    <p:tnLst>
+      <p:par>
+        <p:cTn id="1" dur="indefinite" restart="never" nodeType="tmRoot"/>
+      </p:par>
+    </p:tnLst>
+  </p:timing>
+</p:sld>
+</file>
+
+<file path=ppt/slides/slide8.xml><?xml version="1.0" encoding="utf-8"?>
+<p:sld xmlns:a="http://schemas.openxmlformats.org/drawingml/2006/main" xmlns:r="http://schemas.openxmlformats.org/officeDocument/2006/relationships" xmlns:p="http://schemas.openxmlformats.org/presentationml/2006/main">
+  <p:cSld>
+    <p:bg>
+      <p:bgPr>
+        <a:gradFill>
+          <a:gsLst>
+            <a:gs pos="0">
+              <a:schemeClr val="accent5">
+                <a:lumMod val="75000"/>
+              </a:schemeClr>
+            </a:gs>
+            <a:gs pos="37000">
+              <a:schemeClr val="accent5">
+                <a:lumMod val="40000"/>
+                <a:lumOff val="60000"/>
+              </a:schemeClr>
+            </a:gs>
+            <a:gs pos="66000">
+              <a:schemeClr val="accent5">
+                <a:lumMod val="40000"/>
+                <a:lumOff val="60000"/>
+              </a:schemeClr>
+            </a:gs>
+            <a:gs pos="100000">
+              <a:schemeClr val="accent5">
+                <a:lumMod val="75000"/>
+              </a:schemeClr>
+            </a:gs>
+          </a:gsLst>
+          <a:lin ang="5400000" scaled="1"/>
+        </a:gradFill>
+        <a:effectLst/>
+      </p:bgPr>
+    </p:bg>
+    <p:spTree>
+      <p:nvGrpSpPr>
+        <p:cNvPr id="1" name=""/>
+        <p:cNvGrpSpPr/>
+        <p:nvPr/>
+      </p:nvGrpSpPr>
+      <p:grpSpPr>
+        <a:xfrm>
+          <a:off x="0" y="0"/>
+          <a:ext cx="0" cy="0"/>
+          <a:chOff x="0" y="0"/>
+          <a:chExt cx="0" cy="0"/>
+        </a:xfrm>
+      </p:grpSpPr>
+      <p:sp>
+        <p:nvSpPr>
+          <p:cNvPr id="2" name="Title 1"/>
+          <p:cNvSpPr>
+            <a:spLocks noGrp="1"/>
+          </p:cNvSpPr>
+          <p:nvPr>
+            <p:ph type="ctrTitle"/>
+          </p:nvPr>
+        </p:nvSpPr>
+        <p:spPr>
+          <a:xfrm>
+            <a:off x="1524000" y="1122363"/>
             <a:ext cx="9144000" cy="957160"/>
           </a:xfrm>
         </p:spPr>
@@ -3862,7 +5041,7 @@
 </p:sld>
 </file>
 
-<file path=ppt/slides/slide8.xml><?xml version="1.0" encoding="utf-8"?>
+<file path=ppt/slides/slide9.xml><?xml version="1.0" encoding="utf-8"?>
 <p:sld xmlns:a="http://schemas.openxmlformats.org/drawingml/2006/main" xmlns:r="http://schemas.openxmlformats.org/officeDocument/2006/relationships" xmlns:p="http://schemas.openxmlformats.org/presentationml/2006/main">
   <p:cSld>
     <p:bg>
@@ -4277,117 +5456,6 @@
     <p:extLst>
       <p:ext uri="{BB962C8B-B14F-4D97-AF65-F5344CB8AC3E}">
         <p14:creationId xmlns:p14="http://schemas.microsoft.com/office/powerpoint/2010/main" val="2878312502"/>
-      </p:ext>
-    </p:extLst>
-  </p:cSld>
-  <p:clrMapOvr>
-    <a:masterClrMapping/>
-  </p:clrMapOvr>
-  <p:timing>
-    <p:tnLst>
-      <p:par>
-        <p:cTn id="1" dur="indefinite" restart="never" nodeType="tmRoot"/>
-      </p:par>
-    </p:tnLst>
-  </p:timing>
-</p:sld>
-</file>
-
-<file path=ppt/slides/slide9.xml><?xml version="1.0" encoding="utf-8"?>
-<p:sld xmlns:a="http://schemas.openxmlformats.org/drawingml/2006/main" xmlns:r="http://schemas.openxmlformats.org/officeDocument/2006/relationships" xmlns:p="http://schemas.openxmlformats.org/presentationml/2006/main">
-  <p:cSld>
-    <p:bg>
-      <p:bgPr>
-        <a:gradFill>
-          <a:gsLst>
-            <a:gs pos="0">
-              <a:schemeClr val="accent5">
-                <a:lumMod val="75000"/>
-              </a:schemeClr>
-            </a:gs>
-            <a:gs pos="37000">
-              <a:schemeClr val="accent5">
-                <a:lumMod val="40000"/>
-                <a:lumOff val="60000"/>
-              </a:schemeClr>
-            </a:gs>
-            <a:gs pos="66000">
-              <a:schemeClr val="accent5">
-                <a:lumMod val="40000"/>
-                <a:lumOff val="60000"/>
-              </a:schemeClr>
-            </a:gs>
-            <a:gs pos="100000">
-              <a:schemeClr val="accent5">
-                <a:lumMod val="75000"/>
-              </a:schemeClr>
-            </a:gs>
-          </a:gsLst>
-          <a:lin ang="5400000" scaled="1"/>
-        </a:gradFill>
-        <a:effectLst/>
-      </p:bgPr>
-    </p:bg>
-    <p:spTree>
-      <p:nvGrpSpPr>
-        <p:cNvPr id="1" name=""/>
-        <p:cNvGrpSpPr/>
-        <p:nvPr/>
-      </p:nvGrpSpPr>
-      <p:grpSpPr>
-        <a:xfrm>
-          <a:off x="0" y="0"/>
-          <a:ext cx="0" cy="0"/>
-          <a:chOff x="0" y="0"/>
-          <a:chExt cx="0" cy="0"/>
-        </a:xfrm>
-      </p:grpSpPr>
-      <p:sp>
-        <p:nvSpPr>
-          <p:cNvPr id="2" name="Title 1"/>
-          <p:cNvSpPr>
-            <a:spLocks noGrp="1"/>
-          </p:cNvSpPr>
-          <p:nvPr>
-            <p:ph type="ctrTitle"/>
-          </p:nvPr>
-        </p:nvSpPr>
-        <p:spPr/>
-        <p:txBody>
-          <a:bodyPr/>
-          <a:lstStyle/>
-          <a:p>
-            <a:r>
-              <a:rPr lang="en-CA" dirty="0" smtClean="0"/>
-              <a:t>Video Pitch</a:t>
-            </a:r>
-            <a:endParaRPr lang="en-CA" dirty="0"/>
-          </a:p>
-        </p:txBody>
-      </p:sp>
-      <p:sp>
-        <p:nvSpPr>
-          <p:cNvPr id="3" name="Subtitle 2"/>
-          <p:cNvSpPr>
-            <a:spLocks noGrp="1"/>
-          </p:cNvSpPr>
-          <p:nvPr>
-            <p:ph type="subTitle" idx="1"/>
-          </p:nvPr>
-        </p:nvSpPr>
-        <p:spPr/>
-        <p:txBody>
-          <a:bodyPr/>
-          <a:lstStyle/>
-          <a:p>
-            <a:endParaRPr lang="en-CA" dirty="0"/>
-          </a:p>
-        </p:txBody>
-      </p:sp>
-    </p:spTree>
-    <p:extLst>
-      <p:ext uri="{BB962C8B-B14F-4D97-AF65-F5344CB8AC3E}">
-        <p14:creationId xmlns:p14="http://schemas.microsoft.com/office/powerpoint/2010/main" val="1229901578"/>
       </p:ext>
     </p:extLst>
   </p:cSld>
@@ -4659,7 +5727,7 @@
   <a:extraClrSchemeLst/>
   <a:extLst>
     <a:ext uri="{05A4C25C-085E-4340-85A3-A5531E510DB2}">
-      <thm15:themeFamily xmlns:thm15="http://schemas.microsoft.com/office/thememl/2012/main" name="Office Theme" id="{62F939B6-93AF-4DB8-9C6B-D6C7DFDC589F}" vid="{4A3C46E8-61CC-4603-A589-7422A47A8E4A}"/>
+      <thm15:themeFamily xmlns:thm15="http://schemas.microsoft.com/office/thememl/2012/main" xmlns="" name="Office Theme" id="{62F939B6-93AF-4DB8-9C6B-D6C7DFDC589F}" vid="{4A3C46E8-61CC-4603-A589-7422A47A8E4A}"/>
     </a:ext>
   </a:extLst>
 </a:theme>

</xml_diff>

<commit_message>
Added new slide with Settings for App screen
</commit_message>
<xml_diff>
--- a/PresentDemo/Delta Fountains.pptx
+++ b/PresentDemo/Delta Fountains.pptx
@@ -16,6 +16,7 @@
     <p:sldId id="262" r:id="rId10"/>
     <p:sldId id="266" r:id="rId11"/>
     <p:sldId id="264" r:id="rId12"/>
+    <p:sldId id="267" r:id="rId13"/>
   </p:sldIdLst>
   <p:sldSz cx="12192000" cy="6858000"/>
   <p:notesSz cx="6858000" cy="9144000"/>
@@ -264,7 +265,7 @@
           <a:p>
             <a:fld id="{70555D37-1F87-4CCF-9CE1-02DA0673E71D}" type="datetimeFigureOut">
               <a:rPr lang="en-CA" smtClean="0"/>
-              <a:t>27/03/2015</a:t>
+              <a:t>08/04/2015</a:t>
             </a:fld>
             <a:endParaRPr lang="en-CA"/>
           </a:p>
@@ -434,7 +435,7 @@
           <a:p>
             <a:fld id="{70555D37-1F87-4CCF-9CE1-02DA0673E71D}" type="datetimeFigureOut">
               <a:rPr lang="en-CA" smtClean="0"/>
-              <a:t>27/03/2015</a:t>
+              <a:t>08/04/2015</a:t>
             </a:fld>
             <a:endParaRPr lang="en-CA"/>
           </a:p>
@@ -614,7 +615,7 @@
           <a:p>
             <a:fld id="{70555D37-1F87-4CCF-9CE1-02DA0673E71D}" type="datetimeFigureOut">
               <a:rPr lang="en-CA" smtClean="0"/>
-              <a:t>27/03/2015</a:t>
+              <a:t>08/04/2015</a:t>
             </a:fld>
             <a:endParaRPr lang="en-CA"/>
           </a:p>
@@ -784,7 +785,7 @@
           <a:p>
             <a:fld id="{70555D37-1F87-4CCF-9CE1-02DA0673E71D}" type="datetimeFigureOut">
               <a:rPr lang="en-CA" smtClean="0"/>
-              <a:t>27/03/2015</a:t>
+              <a:t>08/04/2015</a:t>
             </a:fld>
             <a:endParaRPr lang="en-CA"/>
           </a:p>
@@ -1030,7 +1031,7 @@
           <a:p>
             <a:fld id="{70555D37-1F87-4CCF-9CE1-02DA0673E71D}" type="datetimeFigureOut">
               <a:rPr lang="en-CA" smtClean="0"/>
-              <a:t>27/03/2015</a:t>
+              <a:t>08/04/2015</a:t>
             </a:fld>
             <a:endParaRPr lang="en-CA"/>
           </a:p>
@@ -1262,7 +1263,7 @@
           <a:p>
             <a:fld id="{70555D37-1F87-4CCF-9CE1-02DA0673E71D}" type="datetimeFigureOut">
               <a:rPr lang="en-CA" smtClean="0"/>
-              <a:t>27/03/2015</a:t>
+              <a:t>08/04/2015</a:t>
             </a:fld>
             <a:endParaRPr lang="en-CA"/>
           </a:p>
@@ -1629,7 +1630,7 @@
           <a:p>
             <a:fld id="{70555D37-1F87-4CCF-9CE1-02DA0673E71D}" type="datetimeFigureOut">
               <a:rPr lang="en-CA" smtClean="0"/>
-              <a:t>27/03/2015</a:t>
+              <a:t>08/04/2015</a:t>
             </a:fld>
             <a:endParaRPr lang="en-CA"/>
           </a:p>
@@ -1747,7 +1748,7 @@
           <a:p>
             <a:fld id="{70555D37-1F87-4CCF-9CE1-02DA0673E71D}" type="datetimeFigureOut">
               <a:rPr lang="en-CA" smtClean="0"/>
-              <a:t>27/03/2015</a:t>
+              <a:t>08/04/2015</a:t>
             </a:fld>
             <a:endParaRPr lang="en-CA"/>
           </a:p>
@@ -1842,7 +1843,7 @@
           <a:p>
             <a:fld id="{70555D37-1F87-4CCF-9CE1-02DA0673E71D}" type="datetimeFigureOut">
               <a:rPr lang="en-CA" smtClean="0"/>
-              <a:t>27/03/2015</a:t>
+              <a:t>08/04/2015</a:t>
             </a:fld>
             <a:endParaRPr lang="en-CA"/>
           </a:p>
@@ -2119,7 +2120,7 @@
           <a:p>
             <a:fld id="{70555D37-1F87-4CCF-9CE1-02DA0673E71D}" type="datetimeFigureOut">
               <a:rPr lang="en-CA" smtClean="0"/>
-              <a:t>27/03/2015</a:t>
+              <a:t>08/04/2015</a:t>
             </a:fld>
             <a:endParaRPr lang="en-CA"/>
           </a:p>
@@ -2372,7 +2373,7 @@
           <a:p>
             <a:fld id="{70555D37-1F87-4CCF-9CE1-02DA0673E71D}" type="datetimeFigureOut">
               <a:rPr lang="en-CA" smtClean="0"/>
-              <a:t>27/03/2015</a:t>
+              <a:t>08/04/2015</a:t>
             </a:fld>
             <a:endParaRPr lang="en-CA"/>
           </a:p>
@@ -2585,7 +2586,7 @@
           <a:p>
             <a:fld id="{70555D37-1F87-4CCF-9CE1-02DA0673E71D}" type="datetimeFigureOut">
               <a:rPr lang="en-CA" smtClean="0"/>
-              <a:t>27/03/2015</a:t>
+              <a:t>08/04/2015</a:t>
             </a:fld>
             <a:endParaRPr lang="en-CA"/>
           </a:p>
@@ -3526,6 +3527,683 @@
           <a:chExt cx="0" cy="0"/>
         </a:xfrm>
       </p:grpSpPr>
+      <p:pic>
+        <p:nvPicPr>
+          <p:cNvPr id="5" name="Picture 4"/>
+          <p:cNvPicPr>
+            <a:picLocks noChangeAspect="1"/>
+          </p:cNvPicPr>
+          <p:nvPr/>
+        </p:nvPicPr>
+        <p:blipFill>
+          <a:blip r:embed="rId2">
+            <a:extLst>
+              <a:ext uri="{28A0092B-C50C-407E-A947-70E740481C1C}">
+                <a14:useLocalDpi xmlns:a14="http://schemas.microsoft.com/office/drawing/2010/main" val="0"/>
+              </a:ext>
+            </a:extLst>
+          </a:blip>
+          <a:stretch>
+            <a:fillRect/>
+          </a:stretch>
+        </p:blipFill>
+        <p:spPr>
+          <a:xfrm>
+            <a:off x="0" y="0"/>
+            <a:ext cx="3838832" cy="6398054"/>
+          </a:xfrm>
+          <a:prstGeom prst="rect">
+            <a:avLst/>
+          </a:prstGeom>
+        </p:spPr>
+      </p:pic>
+      <p:sp>
+        <p:nvSpPr>
+          <p:cNvPr id="7" name="TextBox 6"/>
+          <p:cNvSpPr txBox="1"/>
+          <p:nvPr/>
+        </p:nvSpPr>
+        <p:spPr>
+          <a:xfrm>
+            <a:off x="0" y="6396335"/>
+            <a:ext cx="3820274" cy="461665"/>
+          </a:xfrm>
+          <a:prstGeom prst="rect">
+            <a:avLst/>
+          </a:prstGeom>
+          <a:noFill/>
+        </p:spPr>
+        <p:txBody>
+          <a:bodyPr wrap="square" rtlCol="0">
+            <a:spAutoFit/>
+          </a:bodyPr>
+          <a:lstStyle/>
+          <a:p>
+            <a:pPr algn="ctr"/>
+            <a:r>
+              <a:rPr lang="en-CA" sz="2400" dirty="0" smtClean="0"/>
+              <a:t>Settings</a:t>
+            </a:r>
+            <a:r>
+              <a:rPr lang="en-CA" sz="2400" dirty="0" smtClean="0"/>
+              <a:t> </a:t>
+            </a:r>
+            <a:r>
+              <a:rPr lang="en-CA" sz="2400" dirty="0" smtClean="0"/>
+              <a:t>Screens</a:t>
+            </a:r>
+            <a:endParaRPr lang="en-CA" sz="2400" dirty="0"/>
+          </a:p>
+        </p:txBody>
+      </p:sp>
+      <p:sp>
+        <p:nvSpPr>
+          <p:cNvPr id="8" name="TextBox 7"/>
+          <p:cNvSpPr txBox="1"/>
+          <p:nvPr/>
+        </p:nvSpPr>
+        <p:spPr>
+          <a:xfrm>
+            <a:off x="4143374" y="476250"/>
+            <a:ext cx="6181726" cy="830997"/>
+          </a:xfrm>
+          <a:prstGeom prst="rect">
+            <a:avLst/>
+          </a:prstGeom>
+          <a:noFill/>
+        </p:spPr>
+        <p:txBody>
+          <a:bodyPr wrap="square" rtlCol="0">
+            <a:spAutoFit/>
+          </a:bodyPr>
+          <a:lstStyle/>
+          <a:p>
+            <a:pPr marL="285750" indent="-285750">
+              <a:buFont typeface="Arial" panose="020B0604020202020204" pitchFamily="34" charset="0"/>
+              <a:buChar char="•"/>
+            </a:pPr>
+            <a:r>
+              <a:rPr lang="en-CA" sz="2400" dirty="0" smtClean="0"/>
+              <a:t>Displays current IP Address and Port number</a:t>
+            </a:r>
+          </a:p>
+          <a:p>
+            <a:pPr marL="285750" indent="-285750">
+              <a:buFont typeface="Arial" panose="020B0604020202020204" pitchFamily="34" charset="0"/>
+              <a:buChar char="•"/>
+            </a:pPr>
+            <a:r>
+              <a:rPr lang="en-CA" sz="2400" dirty="0" smtClean="0"/>
+              <a:t>Gives you the option to enter values</a:t>
+            </a:r>
+            <a:endParaRPr lang="en-CA" sz="2400" dirty="0"/>
+          </a:p>
+        </p:txBody>
+      </p:sp>
+      <p:grpSp>
+        <p:nvGrpSpPr>
+          <p:cNvPr id="38" name="Group 37"/>
+          <p:cNvGrpSpPr/>
+          <p:nvPr/>
+        </p:nvGrpSpPr>
+        <p:grpSpPr>
+          <a:xfrm>
+            <a:off x="3163702" y="1567910"/>
+            <a:ext cx="8732998" cy="4989050"/>
+            <a:chOff x="2973202" y="1510760"/>
+            <a:chExt cx="8732998" cy="4989050"/>
+          </a:xfrm>
+        </p:grpSpPr>
+        <p:grpSp>
+          <p:nvGrpSpPr>
+            <p:cNvPr id="25" name="Group 24"/>
+            <p:cNvGrpSpPr/>
+            <p:nvPr/>
+          </p:nvGrpSpPr>
+          <p:grpSpPr>
+            <a:xfrm>
+              <a:off x="7234237" y="4401766"/>
+              <a:ext cx="1517711" cy="1292153"/>
+              <a:chOff x="7847499" y="1906874"/>
+              <a:chExt cx="1517711" cy="1292153"/>
+            </a:xfrm>
+          </p:grpSpPr>
+          <p:pic>
+            <p:nvPicPr>
+              <p:cNvPr id="9" name="Picture 5" descr="D:\Users\Redfield_01\Pictures\Technology\Raspi_Colour_R.png"/>
+              <p:cNvPicPr>
+                <a:picLocks noChangeAspect="1" noChangeArrowheads="1"/>
+              </p:cNvPicPr>
+              <p:nvPr/>
+            </p:nvPicPr>
+            <p:blipFill>
+              <a:blip r:embed="rId3" cstate="print">
+                <a:extLst>
+                  <a:ext uri="{28A0092B-C50C-407E-A947-70E740481C1C}">
+                    <a14:useLocalDpi xmlns:a14="http://schemas.microsoft.com/office/drawing/2010/main" val="0"/>
+                  </a:ext>
+                </a:extLst>
+              </a:blip>
+              <a:srcRect/>
+              <a:stretch>
+                <a:fillRect/>
+              </a:stretch>
+            </p:blipFill>
+            <p:spPr bwMode="auto">
+              <a:xfrm>
+                <a:off x="8293300" y="1906874"/>
+                <a:ext cx="1071910" cy="1292153"/>
+              </a:xfrm>
+              <a:prstGeom prst="rect">
+                <a:avLst/>
+              </a:prstGeom>
+              <a:noFill/>
+              <a:extLst>
+                <a:ext uri="{909E8E84-426E-40DD-AFC4-6F175D3DCCD1}">
+                  <a14:hiddenFill xmlns:a14="http://schemas.microsoft.com/office/drawing/2010/main">
+                    <a:solidFill>
+                      <a:srgbClr val="FFFFFF"/>
+                    </a:solidFill>
+                  </a14:hiddenFill>
+                </a:ext>
+              </a:extLst>
+            </p:spPr>
+          </p:pic>
+          <p:pic>
+            <p:nvPicPr>
+              <p:cNvPr id="1026" name="Picture 2" descr="http://pixabay.com/static/uploads/photo/2013/07/13/11/44/waves-158549_640.png"/>
+              <p:cNvPicPr>
+                <a:picLocks noChangeAspect="1" noChangeArrowheads="1"/>
+              </p:cNvPicPr>
+              <p:nvPr/>
+            </p:nvPicPr>
+            <p:blipFill>
+              <a:blip r:embed="rId4" cstate="print">
+                <a:extLst>
+                  <a:ext uri="{28A0092B-C50C-407E-A947-70E740481C1C}">
+                    <a14:useLocalDpi xmlns:a14="http://schemas.microsoft.com/office/drawing/2010/main" val="0"/>
+                  </a:ext>
+                </a:extLst>
+              </a:blip>
+              <a:srcRect/>
+              <a:stretch>
+                <a:fillRect/>
+              </a:stretch>
+            </p:blipFill>
+            <p:spPr bwMode="auto">
+              <a:xfrm rot="16200000">
+                <a:off x="7770071" y="2411699"/>
+                <a:ext cx="600658" cy="445801"/>
+              </a:xfrm>
+              <a:prstGeom prst="rect">
+                <a:avLst/>
+              </a:prstGeom>
+              <a:noFill/>
+              <a:extLst>
+                <a:ext uri="{909E8E84-426E-40DD-AFC4-6F175D3DCCD1}">
+                  <a14:hiddenFill xmlns:a14="http://schemas.microsoft.com/office/drawing/2010/main">
+                    <a:solidFill>
+                      <a:srgbClr val="FFFFFF"/>
+                    </a:solidFill>
+                  </a14:hiddenFill>
+                </a:ext>
+              </a:extLst>
+            </p:spPr>
+          </p:pic>
+        </p:grpSp>
+        <p:grpSp>
+          <p:nvGrpSpPr>
+            <p:cNvPr id="22" name="Group 21"/>
+            <p:cNvGrpSpPr/>
+            <p:nvPr/>
+          </p:nvGrpSpPr>
+          <p:grpSpPr>
+            <a:xfrm>
+              <a:off x="2973202" y="4055423"/>
+              <a:ext cx="4308356" cy="2444387"/>
+              <a:chOff x="2740144" y="1641838"/>
+              <a:chExt cx="4308356" cy="2444387"/>
+            </a:xfrm>
+          </p:grpSpPr>
+          <p:grpSp>
+            <p:nvGrpSpPr>
+              <p:cNvPr id="21" name="Group 20"/>
+              <p:cNvGrpSpPr/>
+              <p:nvPr/>
+            </p:nvGrpSpPr>
+            <p:grpSpPr>
+              <a:xfrm>
+                <a:off x="2740144" y="1641838"/>
+                <a:ext cx="4308356" cy="2444387"/>
+                <a:chOff x="2863969" y="639269"/>
+                <a:chExt cx="6965831" cy="4085928"/>
+              </a:xfrm>
+            </p:grpSpPr>
+            <p:pic>
+              <p:nvPicPr>
+                <p:cNvPr id="1030" name="Picture 6" descr="http://static.myce.com/images_posts/2015/01/myce-nexus4-670x393.png"/>
+                <p:cNvPicPr>
+                  <a:picLocks noChangeAspect="1" noChangeArrowheads="1"/>
+                </p:cNvPicPr>
+                <p:nvPr/>
+              </p:nvPicPr>
+              <p:blipFill>
+                <a:blip r:embed="rId5">
+                  <a:extLst>
+                    <a:ext uri="{28A0092B-C50C-407E-A947-70E740481C1C}">
+                      <a14:useLocalDpi xmlns:a14="http://schemas.microsoft.com/office/drawing/2010/main" val="0"/>
+                    </a:ext>
+                  </a:extLst>
+                </a:blip>
+                <a:srcRect/>
+                <a:stretch>
+                  <a:fillRect/>
+                </a:stretch>
+              </p:blipFill>
+              <p:spPr bwMode="auto">
+                <a:xfrm>
+                  <a:off x="2863969" y="639269"/>
+                  <a:ext cx="6965831" cy="4085928"/>
+                </a:xfrm>
+                <a:prstGeom prst="rect">
+                  <a:avLst/>
+                </a:prstGeom>
+                <a:noFill/>
+                <a:extLst>
+                  <a:ext uri="{909E8E84-426E-40DD-AFC4-6F175D3DCCD1}">
+                    <a14:hiddenFill xmlns:a14="http://schemas.microsoft.com/office/drawing/2010/main">
+                      <a:solidFill>
+                        <a:srgbClr val="FFFFFF"/>
+                      </a:solidFill>
+                    </a14:hiddenFill>
+                  </a:ext>
+                </a:extLst>
+              </p:spPr>
+            </p:pic>
+            <p:pic>
+              <p:nvPicPr>
+                <p:cNvPr id="24" name="Picture 5" descr="Screenshot_2015-03-27-11-02-14"/>
+                <p:cNvPicPr>
+                  <a:picLocks noChangeAspect="1" noChangeArrowheads="1"/>
+                </p:cNvPicPr>
+                <p:nvPr/>
+              </p:nvPicPr>
+              <p:blipFill>
+                <a:blip r:embed="rId6" cstate="print">
+                  <a:extLst>
+                    <a:ext uri="{28A0092B-C50C-407E-A947-70E740481C1C}">
+                      <a14:useLocalDpi xmlns:a14="http://schemas.microsoft.com/office/drawing/2010/main" val="0"/>
+                    </a:ext>
+                  </a:extLst>
+                </a:blip>
+                <a:srcRect/>
+                <a:stretch>
+                  <a:fillRect/>
+                </a:stretch>
+              </p:blipFill>
+              <p:spPr bwMode="auto">
+                <a:xfrm>
+                  <a:off x="5484565" y="1198438"/>
+                  <a:ext cx="1749672" cy="2918374"/>
+                </a:xfrm>
+                <a:prstGeom prst="rect">
+                  <a:avLst/>
+                </a:prstGeom>
+                <a:noFill/>
+                <a:ln>
+                  <a:noFill/>
+                </a:ln>
+                <a:extLst>
+                  <a:ext uri="{909E8E84-426E-40DD-AFC4-6F175D3DCCD1}">
+                    <a14:hiddenFill xmlns:a14="http://schemas.microsoft.com/office/drawing/2010/main">
+                      <a:solidFill>
+                        <a:srgbClr val="FFFFFF"/>
+                      </a:solidFill>
+                    </a14:hiddenFill>
+                  </a:ext>
+                  <a:ext uri="{91240B29-F687-4F45-9708-019B960494DF}">
+                    <a14:hiddenLine xmlns:a14="http://schemas.microsoft.com/office/drawing/2010/main" w="9525">
+                      <a:solidFill>
+                        <a:srgbClr val="000000"/>
+                      </a:solidFill>
+                      <a:miter lim="800000"/>
+                      <a:headEnd/>
+                      <a:tailEnd/>
+                    </a14:hiddenLine>
+                  </a:ext>
+                </a:extLst>
+              </p:spPr>
+            </p:pic>
+          </p:grpSp>
+          <p:pic>
+            <p:nvPicPr>
+              <p:cNvPr id="26" name="Picture 2" descr="http://pixabay.com/static/uploads/photo/2013/07/13/11/44/waves-158549_640.png"/>
+              <p:cNvPicPr>
+                <a:picLocks noChangeAspect="1" noChangeArrowheads="1"/>
+              </p:cNvPicPr>
+              <p:nvPr/>
+            </p:nvPicPr>
+            <p:blipFill>
+              <a:blip r:embed="rId4" cstate="print">
+                <a:extLst>
+                  <a:ext uri="{28A0092B-C50C-407E-A947-70E740481C1C}">
+                    <a14:useLocalDpi xmlns:a14="http://schemas.microsoft.com/office/drawing/2010/main" val="0"/>
+                  </a:ext>
+                </a:extLst>
+              </a:blip>
+              <a:srcRect/>
+              <a:stretch>
+                <a:fillRect/>
+              </a:stretch>
+            </p:blipFill>
+            <p:spPr bwMode="auto">
+              <a:xfrm rot="5218692">
+                <a:off x="5423649" y="2400367"/>
+                <a:ext cx="600658" cy="445801"/>
+              </a:xfrm>
+              <a:prstGeom prst="rect">
+                <a:avLst/>
+              </a:prstGeom>
+              <a:noFill/>
+              <a:extLst>
+                <a:ext uri="{909E8E84-426E-40DD-AFC4-6F175D3DCCD1}">
+                  <a14:hiddenFill xmlns:a14="http://schemas.microsoft.com/office/drawing/2010/main">
+                    <a:solidFill>
+                      <a:srgbClr val="FFFFFF"/>
+                    </a:solidFill>
+                  </a14:hiddenFill>
+                </a:ext>
+              </a:extLst>
+            </p:spPr>
+          </p:pic>
+        </p:grpSp>
+        <p:pic>
+          <p:nvPicPr>
+            <p:cNvPr id="23" name="Picture 22"/>
+            <p:cNvPicPr>
+              <a:picLocks noChangeAspect="1"/>
+            </p:cNvPicPr>
+            <p:nvPr/>
+          </p:nvPicPr>
+          <p:blipFill>
+            <a:blip r:embed="rId7" cstate="print">
+              <a:extLst>
+                <a:ext uri="{28A0092B-C50C-407E-A947-70E740481C1C}">
+                  <a14:useLocalDpi xmlns:a14="http://schemas.microsoft.com/office/drawing/2010/main" val="0"/>
+                </a:ext>
+              </a:extLst>
+            </a:blip>
+            <a:stretch>
+              <a:fillRect/>
+            </a:stretch>
+          </p:blipFill>
+          <p:spPr>
+            <a:xfrm>
+              <a:off x="9134499" y="1510760"/>
+              <a:ext cx="2571701" cy="2346915"/>
+            </a:xfrm>
+            <a:prstGeom prst="rect">
+              <a:avLst/>
+            </a:prstGeom>
+          </p:spPr>
+        </p:pic>
+        <p:grpSp>
+          <p:nvGrpSpPr>
+            <p:cNvPr id="37" name="Group 36"/>
+            <p:cNvGrpSpPr/>
+            <p:nvPr/>
+          </p:nvGrpSpPr>
+          <p:grpSpPr>
+            <a:xfrm>
+              <a:off x="8670222" y="3857675"/>
+              <a:ext cx="1668402" cy="1420988"/>
+              <a:chOff x="8670222" y="3857675"/>
+              <a:chExt cx="1668402" cy="1420988"/>
+            </a:xfrm>
+          </p:grpSpPr>
+          <p:grpSp>
+            <p:nvGrpSpPr>
+              <p:cNvPr id="36" name="Group 35"/>
+              <p:cNvGrpSpPr/>
+              <p:nvPr/>
+            </p:nvGrpSpPr>
+            <p:grpSpPr>
+              <a:xfrm>
+                <a:off x="8670222" y="3857675"/>
+                <a:ext cx="1668402" cy="1420988"/>
+                <a:chOff x="8751948" y="3857675"/>
+                <a:chExt cx="1668402" cy="1524508"/>
+              </a:xfrm>
+            </p:grpSpPr>
+            <p:cxnSp>
+              <p:nvCxnSpPr>
+                <p:cNvPr id="28" name="Straight Connector 27"/>
+                <p:cNvCxnSpPr/>
+                <p:nvPr/>
+              </p:nvCxnSpPr>
+              <p:spPr>
+                <a:xfrm>
+                  <a:off x="8751948" y="5382183"/>
+                  <a:ext cx="1668401" cy="0"/>
+                </a:xfrm>
+                <a:prstGeom prst="line">
+                  <a:avLst/>
+                </a:prstGeom>
+                <a:ln w="50800">
+                  <a:solidFill>
+                    <a:srgbClr val="00B0F0"/>
+                  </a:solidFill>
+                </a:ln>
+              </p:spPr>
+              <p:style>
+                <a:lnRef idx="1">
+                  <a:schemeClr val="accent1"/>
+                </a:lnRef>
+                <a:fillRef idx="0">
+                  <a:schemeClr val="accent1"/>
+                </a:fillRef>
+                <a:effectRef idx="0">
+                  <a:schemeClr val="accent1"/>
+                </a:effectRef>
+                <a:fontRef idx="minor">
+                  <a:schemeClr val="tx1"/>
+                </a:fontRef>
+              </p:style>
+            </p:cxnSp>
+            <p:cxnSp>
+              <p:nvCxnSpPr>
+                <p:cNvPr id="30" name="Straight Connector 29"/>
+                <p:cNvCxnSpPr>
+                  <a:endCxn id="23" idx="2"/>
+                </p:cNvCxnSpPr>
+                <p:nvPr/>
+              </p:nvCxnSpPr>
+              <p:spPr>
+                <a:xfrm flipV="1">
+                  <a:off x="10420349" y="3857675"/>
+                  <a:ext cx="1" cy="1524508"/>
+                </a:xfrm>
+                <a:prstGeom prst="line">
+                  <a:avLst/>
+                </a:prstGeom>
+                <a:ln w="50800">
+                  <a:solidFill>
+                    <a:srgbClr val="00B0F0"/>
+                  </a:solidFill>
+                </a:ln>
+              </p:spPr>
+              <p:style>
+                <a:lnRef idx="1">
+                  <a:schemeClr val="accent1"/>
+                </a:lnRef>
+                <a:fillRef idx="0">
+                  <a:schemeClr val="accent1"/>
+                </a:fillRef>
+                <a:effectRef idx="0">
+                  <a:schemeClr val="accent1"/>
+                </a:effectRef>
+                <a:fontRef idx="minor">
+                  <a:schemeClr val="tx1"/>
+                </a:fontRef>
+              </p:style>
+            </p:cxnSp>
+          </p:grpSp>
+          <p:grpSp>
+            <p:nvGrpSpPr>
+              <p:cNvPr id="40" name="Group 39"/>
+              <p:cNvGrpSpPr/>
+              <p:nvPr/>
+            </p:nvGrpSpPr>
+            <p:grpSpPr>
+              <a:xfrm>
+                <a:off x="8670222" y="3857675"/>
+                <a:ext cx="1586676" cy="1306713"/>
+                <a:chOff x="8751948" y="3857675"/>
+                <a:chExt cx="1668402" cy="1524508"/>
+              </a:xfrm>
+            </p:grpSpPr>
+            <p:cxnSp>
+              <p:nvCxnSpPr>
+                <p:cNvPr id="41" name="Straight Connector 40"/>
+                <p:cNvCxnSpPr/>
+                <p:nvPr/>
+              </p:nvCxnSpPr>
+              <p:spPr>
+                <a:xfrm>
+                  <a:off x="8751948" y="5382183"/>
+                  <a:ext cx="1668401" cy="0"/>
+                </a:xfrm>
+                <a:prstGeom prst="line">
+                  <a:avLst/>
+                </a:prstGeom>
+                <a:ln w="50800">
+                  <a:solidFill>
+                    <a:srgbClr val="FF0000"/>
+                  </a:solidFill>
+                </a:ln>
+              </p:spPr>
+              <p:style>
+                <a:lnRef idx="1">
+                  <a:schemeClr val="accent1"/>
+                </a:lnRef>
+                <a:fillRef idx="0">
+                  <a:schemeClr val="accent1"/>
+                </a:fillRef>
+                <a:effectRef idx="0">
+                  <a:schemeClr val="accent1"/>
+                </a:effectRef>
+                <a:fontRef idx="minor">
+                  <a:schemeClr val="tx1"/>
+                </a:fontRef>
+              </p:style>
+            </p:cxnSp>
+            <p:cxnSp>
+              <p:nvCxnSpPr>
+                <p:cNvPr id="42" name="Straight Connector 41"/>
+                <p:cNvCxnSpPr/>
+                <p:nvPr/>
+              </p:nvCxnSpPr>
+              <p:spPr>
+                <a:xfrm flipV="1">
+                  <a:off x="10420349" y="3857675"/>
+                  <a:ext cx="1" cy="1524508"/>
+                </a:xfrm>
+                <a:prstGeom prst="line">
+                  <a:avLst/>
+                </a:prstGeom>
+                <a:ln w="50800">
+                  <a:solidFill>
+                    <a:srgbClr val="FF0000"/>
+                  </a:solidFill>
+                </a:ln>
+              </p:spPr>
+              <p:style>
+                <a:lnRef idx="1">
+                  <a:schemeClr val="accent1"/>
+                </a:lnRef>
+                <a:fillRef idx="0">
+                  <a:schemeClr val="accent1"/>
+                </a:fillRef>
+                <a:effectRef idx="0">
+                  <a:schemeClr val="accent1"/>
+                </a:effectRef>
+                <a:fontRef idx="minor">
+                  <a:schemeClr val="tx1"/>
+                </a:fontRef>
+              </p:style>
+            </p:cxnSp>
+          </p:grpSp>
+        </p:grpSp>
+      </p:grpSp>
+    </p:spTree>
+    <p:extLst>
+      <p:ext uri="{BB962C8B-B14F-4D97-AF65-F5344CB8AC3E}">
+        <p14:creationId xmlns:p14="http://schemas.microsoft.com/office/powerpoint/2010/main" val="1229901578"/>
+      </p:ext>
+    </p:extLst>
+  </p:cSld>
+  <p:clrMapOvr>
+    <a:masterClrMapping/>
+  </p:clrMapOvr>
+  <p:timing>
+    <p:tnLst>
+      <p:par>
+        <p:cTn id="1" dur="indefinite" restart="never" nodeType="tmRoot"/>
+      </p:par>
+    </p:tnLst>
+  </p:timing>
+</p:sld>
+</file>
+
+<file path=ppt/slides/slide12.xml><?xml version="1.0" encoding="utf-8"?>
+<p:sld xmlns:a="http://schemas.openxmlformats.org/drawingml/2006/main" xmlns:r="http://schemas.openxmlformats.org/officeDocument/2006/relationships" xmlns:p="http://schemas.openxmlformats.org/presentationml/2006/main">
+  <p:cSld>
+    <p:bg>
+      <p:bgPr>
+        <a:gradFill>
+          <a:gsLst>
+            <a:gs pos="0">
+              <a:schemeClr val="accent5">
+                <a:lumMod val="75000"/>
+              </a:schemeClr>
+            </a:gs>
+            <a:gs pos="37000">
+              <a:schemeClr val="accent5">
+                <a:lumMod val="40000"/>
+                <a:lumOff val="60000"/>
+              </a:schemeClr>
+            </a:gs>
+            <a:gs pos="66000">
+              <a:schemeClr val="accent5">
+                <a:lumMod val="40000"/>
+                <a:lumOff val="60000"/>
+              </a:schemeClr>
+            </a:gs>
+            <a:gs pos="100000">
+              <a:schemeClr val="accent5">
+                <a:lumMod val="75000"/>
+              </a:schemeClr>
+            </a:gs>
+          </a:gsLst>
+          <a:lin ang="5400000" scaled="1"/>
+        </a:gradFill>
+        <a:effectLst/>
+      </p:bgPr>
+    </p:bg>
+    <p:spTree>
+      <p:nvGrpSpPr>
+        <p:cNvPr id="1" name=""/>
+        <p:cNvGrpSpPr/>
+        <p:nvPr/>
+      </p:nvGrpSpPr>
+      <p:grpSpPr>
+        <a:xfrm>
+          <a:off x="0" y="0"/>
+          <a:ext cx="0" cy="0"/>
+          <a:chOff x="0" y="0"/>
+          <a:chExt cx="0" cy="0"/>
+        </a:xfrm>
+      </p:grpSpPr>
       <p:sp>
         <p:nvSpPr>
           <p:cNvPr id="2" name="Title 1"/>
@@ -3583,7 +4261,7 @@
     </p:spTree>
     <p:extLst>
       <p:ext uri="{BB962C8B-B14F-4D97-AF65-F5344CB8AC3E}">
-        <p14:creationId xmlns:p14="http://schemas.microsoft.com/office/powerpoint/2010/main" val="1229901578"/>
+        <p14:creationId xmlns:p14="http://schemas.microsoft.com/office/powerpoint/2010/main" val="195123065"/>
       </p:ext>
     </p:extLst>
   </p:cSld>
@@ -5200,11 +5878,7 @@
             </a:pPr>
             <a:r>
               <a:rPr lang="en-CA" dirty="0" smtClean="0"/>
-              <a:t>Subnet issue between Phone and </a:t>
-            </a:r>
-            <a:r>
-              <a:rPr lang="en-CA" dirty="0" smtClean="0"/>
-              <a:t>Server</a:t>
+              <a:t>Subnet issue between Phone and Server</a:t>
             </a:r>
           </a:p>
           <a:p>
@@ -5216,7 +5890,6 @@
               <a:rPr lang="en-CA" dirty="0" smtClean="0"/>
               <a:t>Back button for closing the socket</a:t>
             </a:r>
-            <a:endParaRPr lang="en-CA" dirty="0" smtClean="0"/>
           </a:p>
           <a:p>
             <a:pPr marL="342900" indent="-342900" algn="l">
@@ -5352,11 +6025,7 @@
             </a:pPr>
             <a:r>
               <a:rPr lang="en-CA" dirty="0" smtClean="0"/>
-              <a:t>CENG512 – </a:t>
-            </a:r>
-            <a:r>
-              <a:rPr lang="en-CA" dirty="0" smtClean="0"/>
-              <a:t>Hardware Project</a:t>
+              <a:t>CENG512 – Hardware Project</a:t>
             </a:r>
           </a:p>
           <a:p>
@@ -5368,7 +6037,6 @@
               <a:rPr lang="en-CA" dirty="0" smtClean="0"/>
               <a:t>Skills with working with hardware and software</a:t>
             </a:r>
-            <a:endParaRPr lang="en-CA" dirty="0" smtClean="0"/>
           </a:p>
           <a:p>
             <a:pPr marL="342900" indent="-342900" algn="l">
@@ -5377,11 +6045,7 @@
             </a:pPr>
             <a:r>
               <a:rPr lang="en-CA" dirty="0" smtClean="0"/>
-              <a:t>CENG509 – Socket Server </a:t>
-            </a:r>
-            <a:r>
-              <a:rPr lang="en-CA" dirty="0" smtClean="0"/>
-              <a:t>Programming</a:t>
+              <a:t>CENG509 – Socket Server Programming</a:t>
             </a:r>
           </a:p>
           <a:p>
@@ -5393,7 +6057,6 @@
               <a:rPr lang="en-CA" dirty="0" smtClean="0"/>
               <a:t>The communication between the app and the Delta Laser </a:t>
             </a:r>
-            <a:endParaRPr lang="en-CA" dirty="0" smtClean="0"/>
           </a:p>
           <a:p>
             <a:pPr marL="342900" indent="-342900" algn="l">
@@ -5402,11 +6065,7 @@
             </a:pPr>
             <a:r>
               <a:rPr lang="en-CA" dirty="0" smtClean="0"/>
-              <a:t>CENG300 – Android </a:t>
-            </a:r>
-            <a:r>
-              <a:rPr lang="en-CA" dirty="0" smtClean="0"/>
-              <a:t>Development</a:t>
+              <a:t>CENG300 – Android Development</a:t>
             </a:r>
           </a:p>
           <a:p>
@@ -5418,7 +6077,6 @@
               <a:rPr lang="en-CA" dirty="0" smtClean="0"/>
               <a:t>Creation and debugging of the app</a:t>
             </a:r>
-            <a:endParaRPr lang="en-CA" dirty="0" smtClean="0"/>
           </a:p>
           <a:p>
             <a:pPr marL="342900" indent="-342900" algn="l">
@@ -5427,15 +6085,7 @@
             </a:pPr>
             <a:r>
               <a:rPr lang="en-CA" dirty="0" smtClean="0"/>
-              <a:t>CENG510 </a:t>
-            </a:r>
-            <a:r>
-              <a:rPr lang="en-CA" dirty="0" smtClean="0"/>
-              <a:t>– Java </a:t>
-            </a:r>
-            <a:r>
-              <a:rPr lang="en-CA" dirty="0" smtClean="0"/>
-              <a:t>Algorithms</a:t>
+              <a:t>CENG510 – Java Algorithms</a:t>
             </a:r>
           </a:p>
           <a:p>
@@ -5447,7 +6097,6 @@
               <a:rPr lang="en-CA" dirty="0" smtClean="0"/>
               <a:t>Advanced experience in Java</a:t>
             </a:r>
-            <a:endParaRPr lang="en-CA" dirty="0" smtClean="0"/>
           </a:p>
           <a:p>
             <a:pPr marL="342900" indent="-342900" algn="l">
@@ -5571,7 +6220,6 @@
               <a:rPr lang="en-CA" sz="2800" dirty="0" smtClean="0"/>
               <a:t>Keywords</a:t>
             </a:r>
-            <a:endParaRPr lang="en-CA" sz="2800" dirty="0" smtClean="0"/>
           </a:p>
           <a:p>
             <a:pPr marL="285750" indent="-285750">
@@ -5617,11 +6265,91 @@
           </a:p>
         </p:txBody>
       </p:sp>
+      <p:sp>
+        <p:nvSpPr>
+          <p:cNvPr id="18" name="TextBox 17"/>
+          <p:cNvSpPr txBox="1"/>
+          <p:nvPr/>
+        </p:nvSpPr>
+        <p:spPr>
+          <a:xfrm>
+            <a:off x="8375859" y="6382021"/>
+            <a:ext cx="3818161" cy="461665"/>
+          </a:xfrm>
+          <a:prstGeom prst="rect">
+            <a:avLst/>
+          </a:prstGeom>
+          <a:noFill/>
+        </p:spPr>
+        <p:txBody>
+          <a:bodyPr wrap="square" rtlCol="0">
+            <a:spAutoFit/>
+          </a:bodyPr>
+          <a:lstStyle/>
+          <a:p>
+            <a:pPr algn="ctr"/>
+            <a:r>
+              <a:rPr lang="en-CA" sz="2400" dirty="0" smtClean="0"/>
+              <a:t>Help Screen</a:t>
+            </a:r>
+          </a:p>
+        </p:txBody>
+      </p:sp>
+      <p:sp>
+        <p:nvSpPr>
+          <p:cNvPr id="19" name="TextBox 18"/>
+          <p:cNvSpPr txBox="1"/>
+          <p:nvPr/>
+        </p:nvSpPr>
+        <p:spPr>
+          <a:xfrm>
+            <a:off x="3820274" y="-2"/>
+            <a:ext cx="3354883" cy="1231106"/>
+          </a:xfrm>
+          <a:prstGeom prst="rect">
+            <a:avLst/>
+          </a:prstGeom>
+          <a:noFill/>
+        </p:spPr>
+        <p:txBody>
+          <a:bodyPr wrap="square" rtlCol="0">
+            <a:spAutoFit/>
+          </a:bodyPr>
+          <a:lstStyle/>
+          <a:p>
+            <a:pPr marL="285750" indent="-285750">
+              <a:buFont typeface="Arial" panose="020B0604020202020204" pitchFamily="34" charset="0"/>
+              <a:buChar char="•"/>
+            </a:pPr>
+            <a:r>
+              <a:rPr lang="en-CA" sz="2800" dirty="0" smtClean="0"/>
+              <a:t>Simple UI</a:t>
+            </a:r>
+          </a:p>
+          <a:p>
+            <a:pPr marL="285750" indent="-285750">
+              <a:buFont typeface="Arial" panose="020B0604020202020204" pitchFamily="34" charset="0"/>
+              <a:buChar char="•"/>
+            </a:pPr>
+            <a:r>
+              <a:rPr lang="en-CA" sz="2800" dirty="0" smtClean="0"/>
+              <a:t>Three other screens</a:t>
+            </a:r>
+          </a:p>
+          <a:p>
+            <a:pPr marL="285750" indent="-285750">
+              <a:buFont typeface="Arial" panose="020B0604020202020204" pitchFamily="34" charset="0"/>
+              <a:buChar char="•"/>
+            </a:pPr>
+            <a:endParaRPr lang="en-CA" dirty="0"/>
+          </a:p>
+        </p:txBody>
+      </p:sp>
       <p:pic>
         <p:nvPicPr>
-          <p:cNvPr id="8" name="Picture 4" descr="Screenshot_2015-03-27-11-02-24"/>
+          <p:cNvPr id="3" name="Picture 2"/>
           <p:cNvPicPr>
-            <a:picLocks noChangeAspect="1" noChangeArrowheads="1"/>
+            <a:picLocks noChangeAspect="1"/>
           </p:cNvPicPr>
           <p:nvPr/>
         </p:nvPicPr>
@@ -5633,243 +6361,50 @@
               </a:ext>
             </a:extLst>
           </a:blip>
-          <a:srcRect/>
           <a:stretch>
             <a:fillRect/>
           </a:stretch>
         </p:blipFill>
-        <p:spPr bwMode="auto">
-          <a:xfrm>
-            <a:off x="8377881" y="-2"/>
-            <a:ext cx="3814119" cy="6361774"/>
+        <p:spPr>
+          <a:xfrm>
+            <a:off x="0" y="20249"/>
+            <a:ext cx="3817063" cy="6361772"/>
           </a:xfrm>
           <a:prstGeom prst="rect">
             <a:avLst/>
           </a:prstGeom>
-          <a:noFill/>
-          <a:ln>
-            <a:noFill/>
-          </a:ln>
-          <a:extLst>
-            <a:ext uri="{909E8E84-426E-40DD-AFC4-6F175D3DCCD1}">
-              <a14:hiddenFill xmlns:a14="http://schemas.microsoft.com/office/drawing/2010/main">
-                <a:solidFill>
-                  <a:srgbClr val="FFFFFF"/>
-                </a:solidFill>
-              </a14:hiddenFill>
-            </a:ext>
-            <a:ext uri="{91240B29-F687-4F45-9708-019B960494DF}">
-              <a14:hiddenLine xmlns:a14="http://schemas.microsoft.com/office/drawing/2010/main" w="9525">
-                <a:solidFill>
-                  <a:srgbClr val="000000"/>
-                </a:solidFill>
-                <a:miter lim="800000"/>
-                <a:headEnd/>
-                <a:tailEnd/>
-              </a14:hiddenLine>
-            </a:ext>
-          </a:extLst>
         </p:spPr>
       </p:pic>
-      <p:sp>
-        <p:nvSpPr>
-          <p:cNvPr id="18" name="TextBox 17"/>
-          <p:cNvSpPr txBox="1"/>
+      <p:pic>
+        <p:nvPicPr>
+          <p:cNvPr id="4" name="Picture 3"/>
+          <p:cNvPicPr>
+            <a:picLocks noChangeAspect="1"/>
+          </p:cNvPicPr>
           <p:nvPr/>
-        </p:nvSpPr>
+        </p:nvPicPr>
+        <p:blipFill>
+          <a:blip r:embed="rId3">
+            <a:extLst>
+              <a:ext uri="{28A0092B-C50C-407E-A947-70E740481C1C}">
+                <a14:useLocalDpi xmlns:a14="http://schemas.microsoft.com/office/drawing/2010/main" val="0"/>
+              </a:ext>
+            </a:extLst>
+          </a:blip>
+          <a:stretch>
+            <a:fillRect/>
+          </a:stretch>
+        </p:blipFill>
         <p:spPr>
           <a:xfrm>
-            <a:off x="8375859" y="6382021"/>
-            <a:ext cx="3818161" cy="461665"/>
+            <a:off x="8376957" y="-2"/>
+            <a:ext cx="3817063" cy="6361772"/>
           </a:xfrm>
           <a:prstGeom prst="rect">
             <a:avLst/>
           </a:prstGeom>
-          <a:noFill/>
-        </p:spPr>
-        <p:txBody>
-          <a:bodyPr wrap="square" rtlCol="0">
-            <a:spAutoFit/>
-          </a:bodyPr>
-          <a:lstStyle/>
-          <a:p>
-            <a:pPr algn="ctr"/>
-            <a:r>
-              <a:rPr lang="en-CA" sz="2400" dirty="0" smtClean="0"/>
-              <a:t>Help Screen</a:t>
-            </a:r>
-          </a:p>
-        </p:txBody>
-      </p:sp>
-      <p:sp>
-        <p:nvSpPr>
-          <p:cNvPr id="19" name="TextBox 18"/>
-          <p:cNvSpPr txBox="1"/>
-          <p:nvPr/>
-        </p:nvSpPr>
-        <p:spPr>
-          <a:xfrm>
-            <a:off x="3820274" y="-2"/>
-            <a:ext cx="3354883" cy="1231106"/>
-          </a:xfrm>
-          <a:prstGeom prst="rect">
-            <a:avLst/>
-          </a:prstGeom>
-          <a:noFill/>
-        </p:spPr>
-        <p:txBody>
-          <a:bodyPr wrap="square" rtlCol="0">
-            <a:spAutoFit/>
-          </a:bodyPr>
-          <a:lstStyle/>
-          <a:p>
-            <a:pPr marL="285750" indent="-285750">
-              <a:buFont typeface="Arial" panose="020B0604020202020204" pitchFamily="34" charset="0"/>
-              <a:buChar char="•"/>
-            </a:pPr>
-            <a:r>
-              <a:rPr lang="en-CA" sz="2800" dirty="0" smtClean="0"/>
-              <a:t>Simple UI</a:t>
-            </a:r>
-          </a:p>
-          <a:p>
-            <a:pPr marL="285750" indent="-285750">
-              <a:buFont typeface="Arial" panose="020B0604020202020204" pitchFamily="34" charset="0"/>
-              <a:buChar char="•"/>
-            </a:pPr>
-            <a:r>
-              <a:rPr lang="en-CA" sz="2800" dirty="0" smtClean="0"/>
-              <a:t>Three other screens</a:t>
-            </a:r>
-            <a:endParaRPr lang="en-CA" sz="2800" dirty="0" smtClean="0"/>
-          </a:p>
-          <a:p>
-            <a:pPr marL="285750" indent="-285750">
-              <a:buFont typeface="Arial" panose="020B0604020202020204" pitchFamily="34" charset="0"/>
-              <a:buChar char="•"/>
-            </a:pPr>
-            <a:endParaRPr lang="en-CA" dirty="0"/>
-          </a:p>
-        </p:txBody>
-      </p:sp>
-      <p:grpSp>
-        <p:nvGrpSpPr>
-          <p:cNvPr id="15" name="Group 14"/>
-          <p:cNvGrpSpPr/>
-          <p:nvPr/>
-        </p:nvGrpSpPr>
-        <p:grpSpPr>
-          <a:xfrm>
-            <a:off x="6155" y="-2"/>
-            <a:ext cx="3814119" cy="6361774"/>
-            <a:chOff x="6155" y="-2"/>
-            <a:chExt cx="3814119" cy="6361774"/>
-          </a:xfrm>
-        </p:grpSpPr>
-        <p:pic>
-          <p:nvPicPr>
-            <p:cNvPr id="2" name="Picture 2" descr="Screenshot_2015-03-25-16-19-08"/>
-            <p:cNvPicPr>
-              <a:picLocks noChangeAspect="1" noChangeArrowheads="1"/>
-            </p:cNvPicPr>
-            <p:nvPr/>
-          </p:nvPicPr>
-          <p:blipFill>
-            <a:blip r:embed="rId3">
-              <a:extLst>
-                <a:ext uri="{28A0092B-C50C-407E-A947-70E740481C1C}">
-                  <a14:useLocalDpi xmlns:a14="http://schemas.microsoft.com/office/drawing/2010/main" val="0"/>
-                </a:ext>
-              </a:extLst>
-            </a:blip>
-            <a:srcRect/>
-            <a:stretch>
-              <a:fillRect/>
-            </a:stretch>
-          </p:blipFill>
-          <p:spPr bwMode="auto">
-            <a:xfrm>
-              <a:off x="6155" y="-2"/>
-              <a:ext cx="3814119" cy="6361774"/>
-            </a:xfrm>
-            <a:prstGeom prst="rect">
-              <a:avLst/>
-            </a:prstGeom>
-            <a:noFill/>
-            <a:ln>
-              <a:noFill/>
-            </a:ln>
-            <a:extLst>
-              <a:ext uri="{909E8E84-426E-40DD-AFC4-6F175D3DCCD1}">
-                <a14:hiddenFill xmlns:a14="http://schemas.microsoft.com/office/drawing/2010/main">
-                  <a:solidFill>
-                    <a:srgbClr val="FFFFFF"/>
-                  </a:solidFill>
-                </a14:hiddenFill>
-              </a:ext>
-              <a:ext uri="{91240B29-F687-4F45-9708-019B960494DF}">
-                <a14:hiddenLine xmlns:a14="http://schemas.microsoft.com/office/drawing/2010/main" w="9525">
-                  <a:solidFill>
-                    <a:srgbClr val="000000"/>
-                  </a:solidFill>
-                  <a:miter lim="800000"/>
-                  <a:headEnd/>
-                  <a:tailEnd/>
-                </a14:hiddenLine>
-              </a:ext>
-            </a:extLst>
-          </p:spPr>
-        </p:pic>
-        <p:sp>
-          <p:nvSpPr>
-            <p:cNvPr id="14" name="TextBox 13"/>
-            <p:cNvSpPr txBox="1"/>
-            <p:nvPr/>
-          </p:nvSpPr>
-          <p:spPr>
-            <a:xfrm>
-              <a:off x="953458" y="323163"/>
-              <a:ext cx="1528167" cy="338554"/>
-            </a:xfrm>
-            <a:prstGeom prst="rect">
-              <a:avLst/>
-            </a:prstGeom>
-            <a:solidFill>
-              <a:schemeClr val="tx1">
-                <a:lumMod val="85000"/>
-                <a:lumOff val="15000"/>
-              </a:schemeClr>
-            </a:solidFill>
-          </p:spPr>
-          <p:txBody>
-            <a:bodyPr wrap="square" rtlCol="0">
-              <a:spAutoFit/>
-            </a:bodyPr>
-            <a:lstStyle/>
-            <a:p>
-              <a:r>
-                <a:rPr lang="en-CA" sz="1600" dirty="0" smtClean="0">
-                  <a:solidFill>
-                    <a:schemeClr val="bg1">
-                      <a:lumMod val="95000"/>
-                    </a:schemeClr>
-                  </a:solidFill>
-                  <a:latin typeface="Calibri" panose="020F0502020204030204" pitchFamily="34" charset="0"/>
-                </a:rPr>
-                <a:t>Laser</a:t>
-              </a:r>
-              <a:endParaRPr lang="en-CA" sz="1600" dirty="0">
-                <a:solidFill>
-                  <a:schemeClr val="bg1">
-                    <a:lumMod val="95000"/>
-                  </a:schemeClr>
-                </a:solidFill>
-                <a:latin typeface="Calibri" panose="020F0502020204030204" pitchFamily="34" charset="0"/>
-              </a:endParaRPr>
-            </a:p>
-          </p:txBody>
-        </p:sp>
-      </p:grpSp>
+        </p:spPr>
+      </p:pic>
     </p:spTree>
     <p:extLst>
       <p:ext uri="{BB962C8B-B14F-4D97-AF65-F5344CB8AC3E}">

</xml_diff>